<commit_message>
added rest of site
</commit_message>
<xml_diff>
--- a/PIRE/faq/Slides for 2014 PIRE undergraduate information session.pptx
+++ b/PIRE/faq/Slides for 2014 PIRE undergraduate information session.pptx
@@ -5,22 +5,25 @@
     <p:sldMasterId id="2147483648" r:id="rId1"/>
   </p:sldMasterIdLst>
   <p:notesMasterIdLst>
-    <p:notesMasterId r:id="rId15"/>
+    <p:notesMasterId r:id="rId18"/>
   </p:notesMasterIdLst>
   <p:sldIdLst>
     <p:sldId id="256" r:id="rId2"/>
-    <p:sldId id="257" r:id="rId3"/>
-    <p:sldId id="263" r:id="rId4"/>
-    <p:sldId id="264" r:id="rId5"/>
-    <p:sldId id="265" r:id="rId6"/>
-    <p:sldId id="271" r:id="rId7"/>
-    <p:sldId id="274" r:id="rId8"/>
-    <p:sldId id="272" r:id="rId9"/>
-    <p:sldId id="270" r:id="rId10"/>
-    <p:sldId id="266" r:id="rId11"/>
-    <p:sldId id="267" r:id="rId12"/>
-    <p:sldId id="273" r:id="rId13"/>
-    <p:sldId id="268" r:id="rId14"/>
+    <p:sldId id="275" r:id="rId3"/>
+    <p:sldId id="276" r:id="rId4"/>
+    <p:sldId id="257" r:id="rId5"/>
+    <p:sldId id="263" r:id="rId6"/>
+    <p:sldId id="264" r:id="rId7"/>
+    <p:sldId id="265" r:id="rId8"/>
+    <p:sldId id="271" r:id="rId9"/>
+    <p:sldId id="274" r:id="rId10"/>
+    <p:sldId id="272" r:id="rId11"/>
+    <p:sldId id="270" r:id="rId12"/>
+    <p:sldId id="266" r:id="rId13"/>
+    <p:sldId id="267" r:id="rId14"/>
+    <p:sldId id="277" r:id="rId15"/>
+    <p:sldId id="273" r:id="rId16"/>
+    <p:sldId id="268" r:id="rId17"/>
   </p:sldIdLst>
   <p:sldSz cx="9144000" cy="6858000" type="screen4x3"/>
   <p:notesSz cx="6858000" cy="9144000"/>
@@ -204,7 +207,7 @@
           <a:p>
             <a:fld id="{E1BDDAA6-054F-4F05-8617-AAE15B78033D}" type="datetimeFigureOut">
               <a:rPr lang="en-US" smtClean="0"/>
-              <a:t>8/7/14</a:t>
+              <a:t>8/28/14</a:t>
             </a:fld>
             <a:endParaRPr lang="en-US" dirty="0"/>
           </a:p>
@@ -879,6 +882,249 @@
 </p:notes>
 </file>
 
+<file path=ppt/notesSlides/notesSlide14.xml><?xml version="1.0" encoding="utf-8"?>
+<p:notes xmlns:a="http://schemas.openxmlformats.org/drawingml/2006/main" xmlns:r="http://schemas.openxmlformats.org/officeDocument/2006/relationships" xmlns:p="http://schemas.openxmlformats.org/presentationml/2006/main">
+  <p:cSld>
+    <p:spTree>
+      <p:nvGrpSpPr>
+        <p:cNvPr id="1" name=""/>
+        <p:cNvGrpSpPr/>
+        <p:nvPr/>
+      </p:nvGrpSpPr>
+      <p:grpSpPr>
+        <a:xfrm>
+          <a:off x="0" y="0"/>
+          <a:ext cx="0" cy="0"/>
+          <a:chOff x="0" y="0"/>
+          <a:chExt cx="0" cy="0"/>
+        </a:xfrm>
+      </p:grpSpPr>
+      <p:sp>
+        <p:nvSpPr>
+          <p:cNvPr id="2" name="Slide Image Placeholder 1"/>
+          <p:cNvSpPr>
+            <a:spLocks noGrp="1" noRot="1" noChangeAspect="1"/>
+          </p:cNvSpPr>
+          <p:nvPr>
+            <p:ph type="sldImg"/>
+          </p:nvPr>
+        </p:nvSpPr>
+        <p:spPr/>
+      </p:sp>
+      <p:sp>
+        <p:nvSpPr>
+          <p:cNvPr id="3" name="Notes Placeholder 2"/>
+          <p:cNvSpPr>
+            <a:spLocks noGrp="1"/>
+          </p:cNvSpPr>
+          <p:nvPr>
+            <p:ph type="body" idx="1"/>
+          </p:nvPr>
+        </p:nvSpPr>
+        <p:spPr/>
+        <p:txBody>
+          <a:bodyPr>
+            <a:normAutofit/>
+          </a:bodyPr>
+          <a:lstStyle/>
+          <a:p>
+            <a:endParaRPr lang="en-US" dirty="0"/>
+          </a:p>
+        </p:txBody>
+      </p:sp>
+      <p:sp>
+        <p:nvSpPr>
+          <p:cNvPr id="4" name="Slide Number Placeholder 3"/>
+          <p:cNvSpPr>
+            <a:spLocks noGrp="1"/>
+          </p:cNvSpPr>
+          <p:nvPr>
+            <p:ph type="sldNum" sz="quarter" idx="10"/>
+          </p:nvPr>
+        </p:nvSpPr>
+        <p:spPr/>
+        <p:txBody>
+          <a:bodyPr/>
+          <a:lstStyle/>
+          <a:p>
+            <a:fld id="{661F7566-13AA-41C5-AF9C-88BFFFA18394}" type="slidenum">
+              <a:rPr lang="en-US" smtClean="0"/>
+              <a:t>14</a:t>
+            </a:fld>
+            <a:endParaRPr lang="en-US" dirty="0"/>
+          </a:p>
+        </p:txBody>
+      </p:sp>
+    </p:spTree>
+  </p:cSld>
+  <p:clrMapOvr>
+    <a:masterClrMapping/>
+  </p:clrMapOvr>
+</p:notes>
+</file>
+
+<file path=ppt/notesSlides/notesSlide15.xml><?xml version="1.0" encoding="utf-8"?>
+<p:notes xmlns:a="http://schemas.openxmlformats.org/drawingml/2006/main" xmlns:r="http://schemas.openxmlformats.org/officeDocument/2006/relationships" xmlns:p="http://schemas.openxmlformats.org/presentationml/2006/main">
+  <p:cSld>
+    <p:spTree>
+      <p:nvGrpSpPr>
+        <p:cNvPr id="1" name=""/>
+        <p:cNvGrpSpPr/>
+        <p:nvPr/>
+      </p:nvGrpSpPr>
+      <p:grpSpPr>
+        <a:xfrm>
+          <a:off x="0" y="0"/>
+          <a:ext cx="0" cy="0"/>
+          <a:chOff x="0" y="0"/>
+          <a:chExt cx="0" cy="0"/>
+        </a:xfrm>
+      </p:grpSpPr>
+      <p:sp>
+        <p:nvSpPr>
+          <p:cNvPr id="2" name="Slide Image Placeholder 1"/>
+          <p:cNvSpPr>
+            <a:spLocks noGrp="1" noRot="1" noChangeAspect="1"/>
+          </p:cNvSpPr>
+          <p:nvPr>
+            <p:ph type="sldImg"/>
+          </p:nvPr>
+        </p:nvSpPr>
+        <p:spPr/>
+      </p:sp>
+      <p:sp>
+        <p:nvSpPr>
+          <p:cNvPr id="3" name="Notes Placeholder 2"/>
+          <p:cNvSpPr>
+            <a:spLocks noGrp="1"/>
+          </p:cNvSpPr>
+          <p:nvPr>
+            <p:ph type="body" idx="1"/>
+          </p:nvPr>
+        </p:nvSpPr>
+        <p:spPr/>
+        <p:txBody>
+          <a:bodyPr>
+            <a:normAutofit/>
+          </a:bodyPr>
+          <a:lstStyle/>
+          <a:p>
+            <a:endParaRPr lang="en-US" dirty="0"/>
+          </a:p>
+        </p:txBody>
+      </p:sp>
+      <p:sp>
+        <p:nvSpPr>
+          <p:cNvPr id="4" name="Slide Number Placeholder 3"/>
+          <p:cNvSpPr>
+            <a:spLocks noGrp="1"/>
+          </p:cNvSpPr>
+          <p:nvPr>
+            <p:ph type="sldNum" sz="quarter" idx="10"/>
+          </p:nvPr>
+        </p:nvSpPr>
+        <p:spPr/>
+        <p:txBody>
+          <a:bodyPr/>
+          <a:lstStyle/>
+          <a:p>
+            <a:fld id="{661F7566-13AA-41C5-AF9C-88BFFFA18394}" type="slidenum">
+              <a:rPr lang="en-US" smtClean="0"/>
+              <a:t>15</a:t>
+            </a:fld>
+            <a:endParaRPr lang="en-US" dirty="0"/>
+          </a:p>
+        </p:txBody>
+      </p:sp>
+    </p:spTree>
+  </p:cSld>
+  <p:clrMapOvr>
+    <a:masterClrMapping/>
+  </p:clrMapOvr>
+</p:notes>
+</file>
+
+<file path=ppt/notesSlides/notesSlide16.xml><?xml version="1.0" encoding="utf-8"?>
+<p:notes xmlns:a="http://schemas.openxmlformats.org/drawingml/2006/main" xmlns:r="http://schemas.openxmlformats.org/officeDocument/2006/relationships" xmlns:p="http://schemas.openxmlformats.org/presentationml/2006/main">
+  <p:cSld>
+    <p:spTree>
+      <p:nvGrpSpPr>
+        <p:cNvPr id="1" name=""/>
+        <p:cNvGrpSpPr/>
+        <p:nvPr/>
+      </p:nvGrpSpPr>
+      <p:grpSpPr>
+        <a:xfrm>
+          <a:off x="0" y="0"/>
+          <a:ext cx="0" cy="0"/>
+          <a:chOff x="0" y="0"/>
+          <a:chExt cx="0" cy="0"/>
+        </a:xfrm>
+      </p:grpSpPr>
+      <p:sp>
+        <p:nvSpPr>
+          <p:cNvPr id="2" name="Slide Image Placeholder 1"/>
+          <p:cNvSpPr>
+            <a:spLocks noGrp="1" noRot="1" noChangeAspect="1"/>
+          </p:cNvSpPr>
+          <p:nvPr>
+            <p:ph type="sldImg"/>
+          </p:nvPr>
+        </p:nvSpPr>
+        <p:spPr/>
+      </p:sp>
+      <p:sp>
+        <p:nvSpPr>
+          <p:cNvPr id="3" name="Notes Placeholder 2"/>
+          <p:cNvSpPr>
+            <a:spLocks noGrp="1"/>
+          </p:cNvSpPr>
+          <p:nvPr>
+            <p:ph type="body" idx="1"/>
+          </p:nvPr>
+        </p:nvSpPr>
+        <p:spPr/>
+        <p:txBody>
+          <a:bodyPr>
+            <a:normAutofit/>
+          </a:bodyPr>
+          <a:lstStyle/>
+          <a:p>
+            <a:endParaRPr lang="en-US" dirty="0"/>
+          </a:p>
+        </p:txBody>
+      </p:sp>
+      <p:sp>
+        <p:nvSpPr>
+          <p:cNvPr id="4" name="Slide Number Placeholder 3"/>
+          <p:cNvSpPr>
+            <a:spLocks noGrp="1"/>
+          </p:cNvSpPr>
+          <p:nvPr>
+            <p:ph type="sldNum" sz="quarter" idx="10"/>
+          </p:nvPr>
+        </p:nvSpPr>
+        <p:spPr/>
+        <p:txBody>
+          <a:bodyPr/>
+          <a:lstStyle/>
+          <a:p>
+            <a:fld id="{661F7566-13AA-41C5-AF9C-88BFFFA18394}" type="slidenum">
+              <a:rPr lang="en-US" smtClean="0"/>
+              <a:t>16</a:t>
+            </a:fld>
+            <a:endParaRPr lang="en-US" dirty="0"/>
+          </a:p>
+        </p:txBody>
+      </p:sp>
+    </p:spTree>
+  </p:cSld>
+  <p:clrMapOvr>
+    <a:masterClrMapping/>
+  </p:clrMapOvr>
+</p:notes>
+</file>
+
 <file path=ppt/notesSlides/notesSlide2.xml><?xml version="1.0" encoding="utf-8"?>
 <p:notes xmlns:a="http://schemas.openxmlformats.org/drawingml/2006/main" xmlns:r="http://schemas.openxmlformats.org/officeDocument/2006/relationships" xmlns:p="http://schemas.openxmlformats.org/presentationml/2006/main">
   <p:cSld>
@@ -898,7 +1144,7 @@
       </p:grpSpPr>
       <p:sp>
         <p:nvSpPr>
-          <p:cNvPr id="2" name="Slide Image Placeholder 1"/>
+          <p:cNvPr id="15362" name="Slide Image Placeholder 1"/>
           <p:cNvSpPr>
             <a:spLocks noGrp="1" noRot="1" noChangeAspect="1"/>
           </p:cNvSpPr>
@@ -906,11 +1152,13 @@
             <p:ph type="sldImg"/>
           </p:nvPr>
         </p:nvSpPr>
-        <p:spPr/>
-      </p:sp>
-      <p:sp>
-        <p:nvSpPr>
-          <p:cNvPr id="3" name="Notes Placeholder 2"/>
+        <p:spPr>
+          <a:ln/>
+        </p:spPr>
+      </p:sp>
+      <p:sp>
+        <p:nvSpPr>
+          <p:cNvPr id="15363" name="Notes Placeholder 2"/>
           <p:cNvSpPr>
             <a:spLocks noGrp="1"/>
           </p:cNvSpPr>
@@ -918,37 +1166,49 @@
             <p:ph type="body" idx="1"/>
           </p:nvPr>
         </p:nvSpPr>
-        <p:spPr/>
-        <p:txBody>
-          <a:bodyPr>
-            <a:normAutofit/>
-          </a:bodyPr>
-          <a:lstStyle/>
-          <a:p>
-            <a:endParaRPr lang="en-US" dirty="0"/>
-          </a:p>
-        </p:txBody>
-      </p:sp>
-      <p:sp>
-        <p:nvSpPr>
-          <p:cNvPr id="4" name="Slide Number Placeholder 3"/>
-          <p:cNvSpPr>
-            <a:spLocks noGrp="1"/>
-          </p:cNvSpPr>
-          <p:nvPr>
-            <p:ph type="sldNum" sz="quarter" idx="10"/>
-          </p:nvPr>
-        </p:nvSpPr>
-        <p:spPr/>
+        <p:spPr>
+          <a:noFill/>
+          <a:ln/>
+        </p:spPr>
         <p:txBody>
           <a:bodyPr/>
           <a:lstStyle/>
           <a:p>
-            <a:fld id="{661F7566-13AA-41C5-AF9C-88BFFFA18394}" type="slidenum">
-              <a:rPr lang="en-US" smtClean="0"/>
+            <a:endParaRPr lang="en-US" dirty="0">
+              <a:latin typeface="Times" pitchFamily="-108" charset="0"/>
+              <a:ea typeface="ＭＳ Ｐゴシック" pitchFamily="-108" charset="-128"/>
+              <a:cs typeface="ＭＳ Ｐゴシック" pitchFamily="-108" charset="-128"/>
+            </a:endParaRPr>
+          </a:p>
+        </p:txBody>
+      </p:sp>
+      <p:sp>
+        <p:nvSpPr>
+          <p:cNvPr id="15364" name="Slide Number Placeholder 3"/>
+          <p:cNvSpPr>
+            <a:spLocks noGrp="1"/>
+          </p:cNvSpPr>
+          <p:nvPr>
+            <p:ph type="sldNum" sz="quarter" idx="5"/>
+          </p:nvPr>
+        </p:nvSpPr>
+        <p:spPr>
+          <a:noFill/>
+        </p:spPr>
+        <p:txBody>
+          <a:bodyPr/>
+          <a:lstStyle/>
+          <a:p>
+            <a:fld id="{2F330A59-5E88-0A4F-9FF6-4A163649B4C7}" type="slidenum">
+              <a:rPr lang="en-US" smtClean="0">
+                <a:latin typeface="Times" pitchFamily="-108" charset="0"/>
+              </a:rPr>
+              <a:pPr/>
               <a:t>2</a:t>
             </a:fld>
-            <a:endParaRPr lang="en-US" dirty="0"/>
+            <a:endParaRPr lang="en-US" dirty="0" smtClean="0">
+              <a:latin typeface="Times" pitchFamily="-108" charset="0"/>
+            </a:endParaRPr>
           </a:p>
         </p:txBody>
       </p:sp>
@@ -1006,7 +1266,7 @@
           </a:bodyPr>
           <a:lstStyle/>
           <a:p>
-            <a:endParaRPr lang="en-US" dirty="0"/>
+            <a:endParaRPr lang="en-US"/>
           </a:p>
         </p:txBody>
       </p:sp>
@@ -1025,8 +1285,14 @@
           <a:bodyPr/>
           <a:lstStyle/>
           <a:p>
-            <a:fld id="{661F7566-13AA-41C5-AF9C-88BFFFA18394}" type="slidenum">
-              <a:rPr lang="en-US" smtClean="0"/>
+            <a:pPr>
+              <a:defRPr/>
+            </a:pPr>
+            <a:fld id="{B0149EAF-E50F-BB4E-929E-6F0EB3EC79F4}" type="slidenum">
+              <a:rPr lang="en-US" smtClean="0"/>
+              <a:pPr>
+                <a:defRPr/>
+              </a:pPr>
               <a:t>3</a:t>
             </a:fld>
             <a:endParaRPr lang="en-US" dirty="0"/>
@@ -1708,7 +1974,7 @@
           <a:p>
             <a:fld id="{628B8225-AF9E-46B3-908F-F63F03DF1D41}" type="datetimeFigureOut">
               <a:rPr lang="en-US" smtClean="0"/>
-              <a:t>8/7/14</a:t>
+              <a:t>8/28/14</a:t>
             </a:fld>
             <a:endParaRPr lang="en-US" dirty="0"/>
           </a:p>
@@ -1873,7 +2139,7 @@
           <a:p>
             <a:fld id="{628B8225-AF9E-46B3-908F-F63F03DF1D41}" type="datetimeFigureOut">
               <a:rPr lang="en-US" smtClean="0"/>
-              <a:t>8/7/14</a:t>
+              <a:t>8/28/14</a:t>
             </a:fld>
             <a:endParaRPr lang="en-US" dirty="0"/>
           </a:p>
@@ -2048,7 +2314,7 @@
           <a:p>
             <a:fld id="{628B8225-AF9E-46B3-908F-F63F03DF1D41}" type="datetimeFigureOut">
               <a:rPr lang="en-US" smtClean="0"/>
-              <a:t>8/7/14</a:t>
+              <a:t>8/28/14</a:t>
             </a:fld>
             <a:endParaRPr lang="en-US" dirty="0"/>
           </a:p>
@@ -2213,7 +2479,7 @@
           <a:p>
             <a:fld id="{628B8225-AF9E-46B3-908F-F63F03DF1D41}" type="datetimeFigureOut">
               <a:rPr lang="en-US" smtClean="0"/>
-              <a:t>8/7/14</a:t>
+              <a:t>8/28/14</a:t>
             </a:fld>
             <a:endParaRPr lang="en-US" dirty="0"/>
           </a:p>
@@ -2454,7 +2720,7 @@
           <a:p>
             <a:fld id="{628B8225-AF9E-46B3-908F-F63F03DF1D41}" type="datetimeFigureOut">
               <a:rPr lang="en-US" smtClean="0"/>
-              <a:t>8/7/14</a:t>
+              <a:t>8/28/14</a:t>
             </a:fld>
             <a:endParaRPr lang="en-US" dirty="0"/>
           </a:p>
@@ -2737,7 +3003,7 @@
           <a:p>
             <a:fld id="{628B8225-AF9E-46B3-908F-F63F03DF1D41}" type="datetimeFigureOut">
               <a:rPr lang="en-US" smtClean="0"/>
-              <a:t>8/7/14</a:t>
+              <a:t>8/28/14</a:t>
             </a:fld>
             <a:endParaRPr lang="en-US" dirty="0"/>
           </a:p>
@@ -3154,7 +3420,7 @@
           <a:p>
             <a:fld id="{628B8225-AF9E-46B3-908F-F63F03DF1D41}" type="datetimeFigureOut">
               <a:rPr lang="en-US" smtClean="0"/>
-              <a:t>8/7/14</a:t>
+              <a:t>8/28/14</a:t>
             </a:fld>
             <a:endParaRPr lang="en-US" dirty="0"/>
           </a:p>
@@ -3267,7 +3533,7 @@
           <a:p>
             <a:fld id="{628B8225-AF9E-46B3-908F-F63F03DF1D41}" type="datetimeFigureOut">
               <a:rPr lang="en-US" smtClean="0"/>
-              <a:t>8/7/14</a:t>
+              <a:t>8/28/14</a:t>
             </a:fld>
             <a:endParaRPr lang="en-US" dirty="0"/>
           </a:p>
@@ -3357,7 +3623,7 @@
           <a:p>
             <a:fld id="{628B8225-AF9E-46B3-908F-F63F03DF1D41}" type="datetimeFigureOut">
               <a:rPr lang="en-US" smtClean="0"/>
-              <a:t>8/7/14</a:t>
+              <a:t>8/28/14</a:t>
             </a:fld>
             <a:endParaRPr lang="en-US" dirty="0"/>
           </a:p>
@@ -3629,7 +3895,7 @@
           <a:p>
             <a:fld id="{628B8225-AF9E-46B3-908F-F63F03DF1D41}" type="datetimeFigureOut">
               <a:rPr lang="en-US" smtClean="0"/>
-              <a:t>8/7/14</a:t>
+              <a:t>8/28/14</a:t>
             </a:fld>
             <a:endParaRPr lang="en-US" dirty="0"/>
           </a:p>
@@ -3877,7 +4143,7 @@
           <a:p>
             <a:fld id="{628B8225-AF9E-46B3-908F-F63F03DF1D41}" type="datetimeFigureOut">
               <a:rPr lang="en-US" smtClean="0"/>
-              <a:t>8/7/14</a:t>
+              <a:t>8/28/14</a:t>
             </a:fld>
             <a:endParaRPr lang="en-US" dirty="0"/>
           </a:p>
@@ -4085,7 +4351,7 @@
           <a:p>
             <a:fld id="{628B8225-AF9E-46B3-908F-F63F03DF1D41}" type="datetimeFigureOut">
               <a:rPr lang="en-US" smtClean="0"/>
-              <a:t>8/7/14</a:t>
+              <a:t>8/28/14</a:t>
             </a:fld>
             <a:endParaRPr lang="en-US" dirty="0"/>
           </a:p>
@@ -4475,6 +4741,8 @@
                 <a:solidFill>
                   <a:srgbClr val="000099"/>
                 </a:solidFill>
+                <a:latin typeface="Times New Roman"/>
+                <a:cs typeface="Times New Roman"/>
               </a:rPr>
               <a:t>PIRE INFORMATION MEETING</a:t>
             </a:r>
@@ -4482,6 +4750,8 @@
               <a:solidFill>
                 <a:srgbClr val="000099"/>
               </a:solidFill>
+              <a:latin typeface="Times New Roman"/>
+              <a:cs typeface="Times New Roman"/>
             </a:endParaRPr>
           </a:p>
         </p:txBody>
@@ -4506,21 +4776,17 @@
                 <a:solidFill>
                   <a:srgbClr val="000099"/>
                 </a:solidFill>
-              </a:rPr>
-              <a:t>August </a:t>
-            </a:r>
-            <a:r>
-              <a:rPr lang="en-US" dirty="0" smtClean="0">
-                <a:solidFill>
-                  <a:srgbClr val="000099"/>
-                </a:solidFill>
-              </a:rPr>
-              <a:t>2014</a:t>
+                <a:latin typeface="Times New Roman"/>
+                <a:cs typeface="Times New Roman"/>
+              </a:rPr>
+              <a:t>August 2014</a:t>
             </a:r>
             <a:endParaRPr lang="en-US" dirty="0">
               <a:solidFill>
                 <a:srgbClr val="000099"/>
               </a:solidFill>
+              <a:latin typeface="Times New Roman"/>
+              <a:cs typeface="Times New Roman"/>
             </a:endParaRPr>
           </a:p>
         </p:txBody>
@@ -4573,10 +4839,16 @@
           <a:lstStyle/>
           <a:p>
             <a:r>
-              <a:rPr lang="en-US" b="1" dirty="0" smtClean="0"/>
-              <a:t>How do you apply?</a:t>
-            </a:r>
-            <a:endParaRPr lang="en-US" b="1" dirty="0"/>
+              <a:rPr lang="en-US" b="1" dirty="0" smtClean="0">
+                <a:latin typeface="Times New Roman"/>
+                <a:cs typeface="Times New Roman"/>
+              </a:rPr>
+              <a:t>Who can apply?</a:t>
+            </a:r>
+            <a:endParaRPr lang="en-US" b="1" dirty="0">
+              <a:latin typeface="Times New Roman"/>
+              <a:cs typeface="Times New Roman"/>
+            </a:endParaRPr>
           </a:p>
         </p:txBody>
       </p:sp>
@@ -4593,7 +4865,7 @@
         <p:spPr/>
         <p:txBody>
           <a:bodyPr>
-            <a:normAutofit fontScale="62500" lnSpcReduction="20000"/>
+            <a:normAutofit/>
           </a:bodyPr>
           <a:lstStyle/>
           <a:p>
@@ -4601,110 +4873,53 @@
               <a:buNone/>
             </a:pPr>
             <a:r>
-              <a:rPr lang="en-US" b="1" dirty="0" smtClean="0"/>
+              <a:rPr lang="en-US" b="1" dirty="0" smtClean="0">
+                <a:latin typeface="Times New Roman"/>
+                <a:cs typeface="Times New Roman"/>
+              </a:rPr>
               <a:t> </a:t>
             </a:r>
-            <a:endParaRPr lang="en-US" b="1" dirty="0"/>
-          </a:p>
-          <a:p>
-            <a:pPr lvl="0"/>
-            <a:r>
-              <a:rPr lang="en-US" dirty="0" smtClean="0"/>
-              <a:t>Completed </a:t>
-            </a:r>
-            <a:r>
-              <a:rPr lang="en-US" dirty="0"/>
-              <a:t>application form. A copy of the application form can be directly downloaded </a:t>
-            </a:r>
-            <a:r>
-              <a:rPr lang="en-US" dirty="0" smtClean="0"/>
-              <a:t>from </a:t>
-            </a:r>
-            <a:r>
-              <a:rPr lang="en-US" u="sng" dirty="0">
-                <a:hlinkClick r:id="rId3"/>
-              </a:rPr>
-              <a:t>http://cls.psu.edu/pire/pire_faq.html</a:t>
-            </a:r>
-            <a:r>
-              <a:rPr lang="en-US" dirty="0"/>
-              <a:t>. </a:t>
-            </a:r>
-            <a:endParaRPr lang="en-US" dirty="0" smtClean="0"/>
-          </a:p>
-          <a:p>
-            <a:endParaRPr lang="en-US" dirty="0"/>
-          </a:p>
-          <a:p>
-            <a:r>
-              <a:rPr lang="en-US" dirty="0" smtClean="0"/>
-              <a:t>Questions </a:t>
-            </a:r>
-            <a:r>
-              <a:rPr lang="en-US" dirty="0"/>
-              <a:t>about the application process should be directed to your PIRE faculty advisor. You can also write to Sharon Elder at </a:t>
-            </a:r>
-            <a:r>
-              <a:rPr lang="en-US" u="sng" dirty="0" smtClean="0">
-                <a:hlinkClick r:id="rId4"/>
-              </a:rPr>
-              <a:t>pireundergrads@gmail.com</a:t>
-            </a:r>
-            <a:endParaRPr lang="en-US" u="sng" dirty="0" smtClean="0"/>
-          </a:p>
-          <a:p>
-            <a:pPr>
+            <a:endParaRPr lang="en-US" b="1" dirty="0">
+              <a:latin typeface="Times New Roman"/>
+              <a:cs typeface="Times New Roman"/>
+            </a:endParaRPr>
+          </a:p>
+          <a:p>
+            <a:pPr lvl="0">
               <a:buNone/>
             </a:pPr>
-            <a:endParaRPr lang="en-US" dirty="0"/>
-          </a:p>
-          <a:p>
-            <a:pPr lvl="0"/>
-            <a:r>
-              <a:rPr lang="en-US" dirty="0"/>
-              <a:t>Copy of </a:t>
-            </a:r>
-            <a:r>
-              <a:rPr lang="en-US" dirty="0" smtClean="0"/>
-              <a:t>your </a:t>
-            </a:r>
-            <a:r>
-              <a:rPr lang="en-US" dirty="0"/>
-              <a:t>Curriculum </a:t>
-            </a:r>
-            <a:r>
-              <a:rPr lang="en-US" dirty="0" smtClean="0"/>
-              <a:t>Vitae</a:t>
-            </a:r>
-          </a:p>
-          <a:p>
-            <a:pPr lvl="0"/>
-            <a:endParaRPr lang="en-US" dirty="0"/>
-          </a:p>
-          <a:p>
-            <a:pPr lvl="0"/>
-            <a:r>
-              <a:rPr lang="en-US" dirty="0"/>
-              <a:t>A letter of recommendation from the CLS faculty research advisor. The letter of recommendation </a:t>
-            </a:r>
-            <a:r>
-              <a:rPr lang="en-US" dirty="0" smtClean="0"/>
-              <a:t>and application materials must </a:t>
-            </a:r>
-            <a:r>
-              <a:rPr lang="en-US" dirty="0"/>
-              <a:t>be sent directly to Sharon Elder at </a:t>
-            </a:r>
-            <a:r>
-              <a:rPr lang="en-US" u="sng" dirty="0">
-                <a:hlinkClick r:id="rId4"/>
-              </a:rPr>
-              <a:t>pireundergrads@gmail.com</a:t>
-            </a:r>
-            <a:endParaRPr lang="en-US" dirty="0"/>
-          </a:p>
-          <a:p>
-            <a:endParaRPr lang="en-US" dirty="0"/>
+            <a:r>
+              <a:rPr lang="en-US" dirty="0">
+                <a:latin typeface="Times New Roman"/>
+                <a:cs typeface="Times New Roman"/>
+              </a:rPr>
+              <a:t>	</a:t>
+            </a:r>
+            <a:r>
+              <a:rPr lang="en-US" dirty="0" smtClean="0">
+                <a:latin typeface="Times New Roman"/>
+                <a:cs typeface="Times New Roman"/>
+              </a:rPr>
+              <a:t>Eligible </a:t>
+            </a:r>
+            <a:r>
+              <a:rPr lang="en-US" dirty="0">
+                <a:latin typeface="Times New Roman"/>
+                <a:cs typeface="Times New Roman"/>
+              </a:rPr>
+              <a:t>students will have at least once semester in residence remaining at PSU after returning from the summer abroad research </a:t>
+            </a:r>
+            <a:r>
+              <a:rPr lang="en-US" dirty="0" smtClean="0">
+                <a:latin typeface="Times New Roman"/>
+                <a:cs typeface="Times New Roman"/>
+              </a:rPr>
+              <a:t>experience (i.e., students in their senior year are not eligible to apply)</a:t>
+            </a:r>
+            <a:endParaRPr lang="en-US" dirty="0">
+              <a:latin typeface="Times New Roman"/>
+              <a:cs typeface="Times New Roman"/>
+            </a:endParaRPr>
           </a:p>
         </p:txBody>
       </p:sp>
@@ -4717,7 +4932,7 @@
         <p:spPr>
           <a:xfrm>
             <a:off x="381000" y="1295400"/>
-            <a:ext cx="8458200" cy="4876800"/>
+            <a:ext cx="8077200" cy="4876800"/>
           </a:xfrm>
           <a:prstGeom prst="rect">
             <a:avLst/>
@@ -4800,16 +5015,591 @@
             <p:ph type="title"/>
           </p:nvPr>
         </p:nvSpPr>
+        <p:spPr>
+          <a:xfrm>
+            <a:off x="457200" y="0"/>
+            <a:ext cx="8229600" cy="1143000"/>
+          </a:xfrm>
+        </p:spPr>
+        <p:txBody>
+          <a:bodyPr>
+            <a:normAutofit fontScale="90000"/>
+          </a:bodyPr>
+          <a:lstStyle/>
+          <a:p>
+            <a:r>
+              <a:rPr lang="en-US" dirty="0" smtClean="0">
+                <a:latin typeface="Times New Roman"/>
+                <a:cs typeface="Times New Roman"/>
+              </a:rPr>
+              <a:t>What are PIRE fellows expected to do?</a:t>
+            </a:r>
+            <a:endParaRPr lang="en-US" dirty="0">
+              <a:latin typeface="Times New Roman"/>
+              <a:cs typeface="Times New Roman"/>
+            </a:endParaRPr>
+          </a:p>
+        </p:txBody>
+      </p:sp>
+      <p:sp>
+        <p:nvSpPr>
+          <p:cNvPr id="3" name="Content Placeholder 2"/>
+          <p:cNvSpPr>
+            <a:spLocks noGrp="1"/>
+          </p:cNvSpPr>
+          <p:nvPr>
+            <p:ph idx="1"/>
+          </p:nvPr>
+        </p:nvSpPr>
+        <p:spPr/>
+        <p:txBody>
+          <a:bodyPr>
+            <a:normAutofit fontScale="92500" lnSpcReduction="20000"/>
+          </a:bodyPr>
+          <a:lstStyle/>
+          <a:p>
+            <a:pPr lvl="0"/>
+            <a:r>
+              <a:rPr lang="en-US" dirty="0">
+                <a:latin typeface="Times New Roman"/>
+                <a:cs typeface="Times New Roman"/>
+              </a:rPr>
+              <a:t>Enroll in 6 credits of LING 496 during the summer of travel </a:t>
+            </a:r>
+            <a:r>
+              <a:rPr lang="en-US" dirty="0" smtClean="0">
+                <a:latin typeface="Times New Roman"/>
+                <a:cs typeface="Times New Roman"/>
+              </a:rPr>
+              <a:t>abroad </a:t>
+            </a:r>
+          </a:p>
+          <a:p>
+            <a:pPr lvl="0">
+              <a:buNone/>
+            </a:pPr>
+            <a:endParaRPr lang="en-US" dirty="0">
+              <a:latin typeface="Times New Roman"/>
+              <a:cs typeface="Times New Roman"/>
+            </a:endParaRPr>
+          </a:p>
+          <a:p>
+            <a:pPr lvl="0"/>
+            <a:r>
+              <a:rPr lang="en-US" dirty="0">
+                <a:latin typeface="Times New Roman"/>
+                <a:cs typeface="Times New Roman"/>
+              </a:rPr>
+              <a:t>Enroll in 3 research credits with their CLS advisor during the returning in- residence semester (i.e. Fall </a:t>
+            </a:r>
+            <a:r>
+              <a:rPr lang="en-US" dirty="0" smtClean="0">
+                <a:latin typeface="Times New Roman"/>
+                <a:cs typeface="Times New Roman"/>
+              </a:rPr>
+              <a:t>2015 </a:t>
+            </a:r>
+            <a:r>
+              <a:rPr lang="en-US" dirty="0">
+                <a:latin typeface="Times New Roman"/>
+                <a:cs typeface="Times New Roman"/>
+              </a:rPr>
+              <a:t>for students traveling during Summer </a:t>
+            </a:r>
+            <a:r>
+              <a:rPr lang="en-US" dirty="0" smtClean="0">
+                <a:latin typeface="Times New Roman"/>
+                <a:cs typeface="Times New Roman"/>
+              </a:rPr>
+              <a:t>2015) </a:t>
+            </a:r>
+            <a:r>
+              <a:rPr lang="en-US" dirty="0">
+                <a:latin typeface="Times New Roman"/>
+                <a:cs typeface="Times New Roman"/>
+              </a:rPr>
+              <a:t>to complete their </a:t>
+            </a:r>
+            <a:r>
+              <a:rPr lang="en-US" dirty="0" smtClean="0">
+                <a:latin typeface="Times New Roman"/>
+                <a:cs typeface="Times New Roman"/>
+              </a:rPr>
+              <a:t>project and </a:t>
+            </a:r>
+            <a:r>
+              <a:rPr lang="en-US" dirty="0">
+                <a:latin typeface="Times New Roman"/>
+                <a:cs typeface="Times New Roman"/>
+              </a:rPr>
+              <a:t>present their work at the </a:t>
+            </a:r>
+            <a:r>
+              <a:rPr lang="en-US" dirty="0" smtClean="0">
+                <a:latin typeface="Times New Roman"/>
+                <a:cs typeface="Times New Roman"/>
+              </a:rPr>
+              <a:t>CLS.</a:t>
+            </a:r>
+          </a:p>
+          <a:p>
+            <a:pPr marL="0" lvl="0" indent="0">
+              <a:buNone/>
+            </a:pPr>
+            <a:endParaRPr lang="en-US" dirty="0">
+              <a:latin typeface="Times New Roman"/>
+              <a:cs typeface="Times New Roman"/>
+            </a:endParaRPr>
+          </a:p>
+          <a:p>
+            <a:pPr lvl="0"/>
+            <a:r>
+              <a:rPr lang="en-US" dirty="0">
+                <a:latin typeface="Times New Roman"/>
+                <a:cs typeface="Times New Roman"/>
+              </a:rPr>
+              <a:t>Attend the CLS meetings, which are held every Friday </a:t>
+            </a:r>
+            <a:r>
+              <a:rPr lang="en-US" dirty="0" smtClean="0">
+                <a:latin typeface="Times New Roman"/>
+                <a:cs typeface="Times New Roman"/>
+              </a:rPr>
+              <a:t>morning</a:t>
+            </a:r>
+            <a:r>
+              <a:rPr lang="en-US" dirty="0">
+                <a:latin typeface="Times New Roman"/>
+                <a:cs typeface="Times New Roman"/>
+              </a:rPr>
+              <a:t> </a:t>
+            </a:r>
+            <a:r>
+              <a:rPr lang="en-US" dirty="0" smtClean="0">
+                <a:latin typeface="Times New Roman"/>
+                <a:cs typeface="Times New Roman"/>
+              </a:rPr>
+              <a:t>from 9:00 to 10:30 in Moore 127.</a:t>
+            </a:r>
+            <a:endParaRPr lang="en-US" dirty="0">
+              <a:latin typeface="Times New Roman"/>
+              <a:cs typeface="Times New Roman"/>
+            </a:endParaRPr>
+          </a:p>
+        </p:txBody>
+      </p:sp>
+      <p:sp>
+        <p:nvSpPr>
+          <p:cNvPr id="4" name="Rectangle 3"/>
+          <p:cNvSpPr/>
+          <p:nvPr/>
+        </p:nvSpPr>
+        <p:spPr>
+          <a:xfrm>
+            <a:off x="381000" y="1295400"/>
+            <a:ext cx="8534400" cy="4876800"/>
+          </a:xfrm>
+          <a:prstGeom prst="rect">
+            <a:avLst/>
+          </a:prstGeom>
+          <a:noFill/>
+          <a:ln>
+            <a:solidFill>
+              <a:srgbClr val="FF0000"/>
+            </a:solidFill>
+          </a:ln>
+        </p:spPr>
+        <p:style>
+          <a:lnRef idx="2">
+            <a:schemeClr val="accent1">
+              <a:shade val="50000"/>
+            </a:schemeClr>
+          </a:lnRef>
+          <a:fillRef idx="1">
+            <a:schemeClr val="accent1"/>
+          </a:fillRef>
+          <a:effectRef idx="0">
+            <a:schemeClr val="accent1"/>
+          </a:effectRef>
+          <a:fontRef idx="minor">
+            <a:schemeClr val="lt1"/>
+          </a:fontRef>
+        </p:style>
+        <p:txBody>
+          <a:bodyPr rtlCol="0" anchor="ctr"/>
+          <a:lstStyle/>
+          <a:p>
+            <a:pPr algn="ctr"/>
+            <a:endParaRPr lang="en-US" dirty="0">
+              <a:solidFill>
+                <a:srgbClr val="FF0000"/>
+              </a:solidFill>
+            </a:endParaRPr>
+          </a:p>
+        </p:txBody>
+      </p:sp>
+    </p:spTree>
+  </p:cSld>
+  <p:clrMapOvr>
+    <a:masterClrMapping/>
+  </p:clrMapOvr>
+</p:sld>
+</file>
+
+<file path=ppt/slides/slide12.xml><?xml version="1.0" encoding="utf-8"?>
+<p:sld xmlns:a="http://schemas.openxmlformats.org/drawingml/2006/main" xmlns:r="http://schemas.openxmlformats.org/officeDocument/2006/relationships" xmlns:p="http://schemas.openxmlformats.org/presentationml/2006/main">
+  <p:cSld>
+    <p:spTree>
+      <p:nvGrpSpPr>
+        <p:cNvPr id="1" name=""/>
+        <p:cNvGrpSpPr/>
+        <p:nvPr/>
+      </p:nvGrpSpPr>
+      <p:grpSpPr>
+        <a:xfrm>
+          <a:off x="0" y="0"/>
+          <a:ext cx="0" cy="0"/>
+          <a:chOff x="0" y="0"/>
+          <a:chExt cx="0" cy="0"/>
+        </a:xfrm>
+      </p:grpSpPr>
+      <p:sp>
+        <p:nvSpPr>
+          <p:cNvPr id="2" name="Title 1"/>
+          <p:cNvSpPr>
+            <a:spLocks noGrp="1"/>
+          </p:cNvSpPr>
+          <p:nvPr>
+            <p:ph type="title"/>
+          </p:nvPr>
+        </p:nvSpPr>
         <p:spPr/>
         <p:txBody>
           <a:bodyPr/>
           <a:lstStyle/>
           <a:p>
             <a:r>
-              <a:rPr lang="en-US" b="1" dirty="0" smtClean="0"/>
+              <a:rPr lang="en-US" b="1" dirty="0" smtClean="0">
+                <a:latin typeface="Times New Roman"/>
+                <a:cs typeface="Times New Roman"/>
+              </a:rPr>
+              <a:t>How do you apply?</a:t>
+            </a:r>
+            <a:endParaRPr lang="en-US" b="1" dirty="0">
+              <a:latin typeface="Times New Roman"/>
+              <a:cs typeface="Times New Roman"/>
+            </a:endParaRPr>
+          </a:p>
+        </p:txBody>
+      </p:sp>
+      <p:sp>
+        <p:nvSpPr>
+          <p:cNvPr id="3" name="Content Placeholder 2"/>
+          <p:cNvSpPr>
+            <a:spLocks noGrp="1"/>
+          </p:cNvSpPr>
+          <p:nvPr>
+            <p:ph idx="1"/>
+          </p:nvPr>
+        </p:nvSpPr>
+        <p:spPr/>
+        <p:txBody>
+          <a:bodyPr>
+            <a:normAutofit fontScale="70000" lnSpcReduction="20000"/>
+          </a:bodyPr>
+          <a:lstStyle/>
+          <a:p>
+            <a:pPr>
+              <a:buNone/>
+            </a:pPr>
+            <a:r>
+              <a:rPr lang="en-US" b="1" dirty="0" smtClean="0">
+                <a:latin typeface="Times New Roman"/>
+                <a:cs typeface="Times New Roman"/>
+              </a:rPr>
+              <a:t> </a:t>
+            </a:r>
+            <a:endParaRPr lang="en-US" b="1" dirty="0">
+              <a:latin typeface="Times New Roman"/>
+              <a:cs typeface="Times New Roman"/>
+            </a:endParaRPr>
+          </a:p>
+          <a:p>
+            <a:pPr lvl="0"/>
+            <a:r>
+              <a:rPr lang="en-US" dirty="0" smtClean="0">
+                <a:latin typeface="Times New Roman"/>
+                <a:cs typeface="Times New Roman"/>
+              </a:rPr>
+              <a:t>Completed </a:t>
+            </a:r>
+            <a:r>
+              <a:rPr lang="en-US" dirty="0">
+                <a:latin typeface="Times New Roman"/>
+                <a:cs typeface="Times New Roman"/>
+              </a:rPr>
+              <a:t>application form. A copy of the application form can be directly downloaded </a:t>
+            </a:r>
+            <a:r>
+              <a:rPr lang="en-US" dirty="0" smtClean="0">
+                <a:latin typeface="Times New Roman"/>
+                <a:cs typeface="Times New Roman"/>
+              </a:rPr>
+              <a:t>from </a:t>
+            </a:r>
+            <a:r>
+              <a:rPr lang="en-US" u="sng" dirty="0">
+                <a:latin typeface="Times New Roman"/>
+                <a:cs typeface="Times New Roman"/>
+                <a:hlinkClick r:id="rId3"/>
+              </a:rPr>
+              <a:t>http://cls.psu.edu/pire/pire_faq.html</a:t>
+            </a:r>
+            <a:r>
+              <a:rPr lang="en-US" dirty="0">
+                <a:latin typeface="Times New Roman"/>
+                <a:cs typeface="Times New Roman"/>
+              </a:rPr>
+              <a:t>. </a:t>
+            </a:r>
+            <a:endParaRPr lang="en-US" dirty="0" smtClean="0">
+              <a:latin typeface="Times New Roman"/>
+              <a:cs typeface="Times New Roman"/>
+            </a:endParaRPr>
+          </a:p>
+          <a:p>
+            <a:endParaRPr lang="en-US" dirty="0">
+              <a:latin typeface="Times New Roman"/>
+              <a:cs typeface="Times New Roman"/>
+            </a:endParaRPr>
+          </a:p>
+          <a:p>
+            <a:r>
+              <a:rPr lang="en-US" dirty="0" smtClean="0">
+                <a:latin typeface="Times New Roman"/>
+                <a:cs typeface="Times New Roman"/>
+              </a:rPr>
+              <a:t>Questions </a:t>
+            </a:r>
+            <a:r>
+              <a:rPr lang="en-US" dirty="0">
+                <a:latin typeface="Times New Roman"/>
+                <a:cs typeface="Times New Roman"/>
+              </a:rPr>
+              <a:t>about the application process should be directed to your PIRE faculty advisor. You can also write to Sharon Elder at </a:t>
+            </a:r>
+            <a:r>
+              <a:rPr lang="en-US" u="sng" dirty="0" smtClean="0">
+                <a:latin typeface="Times New Roman"/>
+                <a:cs typeface="Times New Roman"/>
+                <a:hlinkClick r:id="rId4"/>
+              </a:rPr>
+              <a:t>pireundergrads@gmail.com</a:t>
+            </a:r>
+            <a:endParaRPr lang="en-US" u="sng" dirty="0" smtClean="0">
+              <a:latin typeface="Times New Roman"/>
+              <a:cs typeface="Times New Roman"/>
+            </a:endParaRPr>
+          </a:p>
+          <a:p>
+            <a:pPr>
+              <a:buNone/>
+            </a:pPr>
+            <a:endParaRPr lang="en-US" dirty="0">
+              <a:latin typeface="Times New Roman"/>
+              <a:cs typeface="Times New Roman"/>
+            </a:endParaRPr>
+          </a:p>
+          <a:p>
+            <a:pPr lvl="0"/>
+            <a:r>
+              <a:rPr lang="en-US" dirty="0">
+                <a:latin typeface="Times New Roman"/>
+                <a:cs typeface="Times New Roman"/>
+              </a:rPr>
+              <a:t>Copy of </a:t>
+            </a:r>
+            <a:r>
+              <a:rPr lang="en-US" dirty="0" smtClean="0">
+                <a:latin typeface="Times New Roman"/>
+                <a:cs typeface="Times New Roman"/>
+              </a:rPr>
+              <a:t>your </a:t>
+            </a:r>
+            <a:r>
+              <a:rPr lang="en-US" dirty="0">
+                <a:latin typeface="Times New Roman"/>
+                <a:cs typeface="Times New Roman"/>
+              </a:rPr>
+              <a:t>Curriculum </a:t>
+            </a:r>
+            <a:r>
+              <a:rPr lang="en-US" dirty="0" smtClean="0">
+                <a:latin typeface="Times New Roman"/>
+                <a:cs typeface="Times New Roman"/>
+              </a:rPr>
+              <a:t>Vitae</a:t>
+            </a:r>
+          </a:p>
+          <a:p>
+            <a:pPr lvl="0"/>
+            <a:endParaRPr lang="en-US" dirty="0">
+              <a:latin typeface="Times New Roman"/>
+              <a:cs typeface="Times New Roman"/>
+            </a:endParaRPr>
+          </a:p>
+          <a:p>
+            <a:pPr lvl="0"/>
+            <a:r>
+              <a:rPr lang="en-US" dirty="0">
+                <a:latin typeface="Times New Roman"/>
+                <a:cs typeface="Times New Roman"/>
+              </a:rPr>
+              <a:t>A letter of recommendation from the CLS faculty research advisor. The letter of recommendation </a:t>
+            </a:r>
+            <a:r>
+              <a:rPr lang="en-US" dirty="0" smtClean="0">
+                <a:latin typeface="Times New Roman"/>
+                <a:cs typeface="Times New Roman"/>
+              </a:rPr>
+              <a:t>and application materials must </a:t>
+            </a:r>
+            <a:r>
+              <a:rPr lang="en-US" dirty="0">
+                <a:latin typeface="Times New Roman"/>
+                <a:cs typeface="Times New Roman"/>
+              </a:rPr>
+              <a:t>be sent directly to Sharon Elder at </a:t>
+            </a:r>
+            <a:r>
+              <a:rPr lang="en-US" u="sng" dirty="0">
+                <a:latin typeface="Times New Roman"/>
+                <a:cs typeface="Times New Roman"/>
+                <a:hlinkClick r:id="rId4"/>
+              </a:rPr>
+              <a:t>pireundergrads@gmail.com</a:t>
+            </a:r>
+            <a:endParaRPr lang="en-US" dirty="0">
+              <a:latin typeface="Times New Roman"/>
+              <a:cs typeface="Times New Roman"/>
+            </a:endParaRPr>
+          </a:p>
+          <a:p>
+            <a:endParaRPr lang="en-US" dirty="0">
+              <a:latin typeface="Times New Roman"/>
+              <a:cs typeface="Times New Roman"/>
+            </a:endParaRPr>
+          </a:p>
+        </p:txBody>
+      </p:sp>
+      <p:sp>
+        <p:nvSpPr>
+          <p:cNvPr id="4" name="Rectangle 3"/>
+          <p:cNvSpPr/>
+          <p:nvPr/>
+        </p:nvSpPr>
+        <p:spPr>
+          <a:xfrm>
+            <a:off x="381000" y="1295400"/>
+            <a:ext cx="8458200" cy="4876800"/>
+          </a:xfrm>
+          <a:prstGeom prst="rect">
+            <a:avLst/>
+          </a:prstGeom>
+          <a:noFill/>
+          <a:ln>
+            <a:solidFill>
+              <a:srgbClr val="FF0000"/>
+            </a:solidFill>
+          </a:ln>
+        </p:spPr>
+        <p:style>
+          <a:lnRef idx="2">
+            <a:schemeClr val="accent1">
+              <a:shade val="50000"/>
+            </a:schemeClr>
+          </a:lnRef>
+          <a:fillRef idx="1">
+            <a:schemeClr val="accent1"/>
+          </a:fillRef>
+          <a:effectRef idx="0">
+            <a:schemeClr val="accent1"/>
+          </a:effectRef>
+          <a:fontRef idx="minor">
+            <a:schemeClr val="lt1"/>
+          </a:fontRef>
+        </p:style>
+        <p:txBody>
+          <a:bodyPr rtlCol="0" anchor="ctr"/>
+          <a:lstStyle/>
+          <a:p>
+            <a:pPr algn="ctr"/>
+            <a:endParaRPr lang="en-US" dirty="0">
+              <a:solidFill>
+                <a:srgbClr val="FF0000"/>
+              </a:solidFill>
+            </a:endParaRPr>
+          </a:p>
+        </p:txBody>
+      </p:sp>
+    </p:spTree>
+  </p:cSld>
+  <p:clrMapOvr>
+    <a:masterClrMapping/>
+  </p:clrMapOvr>
+  <p:timing>
+    <p:tnLst>
+      <p:par>
+        <p:cTn xmlns:p14="http://schemas.microsoft.com/office/powerpoint/2010/main" id="1" dur="indefinite" restart="never" nodeType="tmRoot"/>
+      </p:par>
+    </p:tnLst>
+  </p:timing>
+</p:sld>
+</file>
+
+<file path=ppt/slides/slide13.xml><?xml version="1.0" encoding="utf-8"?>
+<p:sld xmlns:a="http://schemas.openxmlformats.org/drawingml/2006/main" xmlns:r="http://schemas.openxmlformats.org/officeDocument/2006/relationships" xmlns:p="http://schemas.openxmlformats.org/presentationml/2006/main">
+  <p:cSld>
+    <p:spTree>
+      <p:nvGrpSpPr>
+        <p:cNvPr id="1" name=""/>
+        <p:cNvGrpSpPr/>
+        <p:nvPr/>
+      </p:nvGrpSpPr>
+      <p:grpSpPr>
+        <a:xfrm>
+          <a:off x="0" y="0"/>
+          <a:ext cx="0" cy="0"/>
+          <a:chOff x="0" y="0"/>
+          <a:chExt cx="0" cy="0"/>
+        </a:xfrm>
+      </p:grpSpPr>
+      <p:sp>
+        <p:nvSpPr>
+          <p:cNvPr id="2" name="Title 1"/>
+          <p:cNvSpPr>
+            <a:spLocks noGrp="1"/>
+          </p:cNvSpPr>
+          <p:nvPr>
+            <p:ph type="title"/>
+          </p:nvPr>
+        </p:nvSpPr>
+        <p:spPr/>
+        <p:txBody>
+          <a:bodyPr/>
+          <a:lstStyle/>
+          <a:p>
+            <a:r>
+              <a:rPr lang="en-US" b="1" dirty="0" smtClean="0">
+                <a:latin typeface="Times New Roman"/>
+                <a:cs typeface="Times New Roman"/>
+              </a:rPr>
               <a:t>When are applications due?</a:t>
             </a:r>
-            <a:endParaRPr lang="en-US" b="1" dirty="0"/>
+            <a:endParaRPr lang="en-US" b="1" dirty="0">
+              <a:latin typeface="Times New Roman"/>
+              <a:cs typeface="Times New Roman"/>
+            </a:endParaRPr>
           </a:p>
         </p:txBody>
       </p:sp>
@@ -4834,44 +5624,73 @@
               <a:buNone/>
             </a:pPr>
             <a:r>
-              <a:rPr lang="en-US" b="1" dirty="0" smtClean="0"/>
+              <a:rPr lang="en-US" b="1" dirty="0" smtClean="0">
+                <a:latin typeface="Times New Roman"/>
+                <a:cs typeface="Times New Roman"/>
+              </a:rPr>
               <a:t> </a:t>
             </a:r>
-            <a:endParaRPr lang="en-US" b="1" dirty="0"/>
-          </a:p>
-          <a:p>
-            <a:r>
-              <a:rPr lang="en-US" dirty="0"/>
+            <a:endParaRPr lang="en-US" b="1" dirty="0">
+              <a:latin typeface="Times New Roman"/>
+              <a:cs typeface="Times New Roman"/>
+            </a:endParaRPr>
+          </a:p>
+          <a:p>
+            <a:r>
+              <a:rPr lang="en-US" dirty="0">
+                <a:latin typeface="Times New Roman"/>
+                <a:cs typeface="Times New Roman"/>
+              </a:rPr>
               <a:t>Applications are due </a:t>
             </a:r>
             <a:r>
-              <a:rPr lang="en-US" dirty="0" smtClean="0"/>
+              <a:rPr lang="en-US" dirty="0" smtClean="0">
+                <a:latin typeface="Times New Roman"/>
+                <a:cs typeface="Times New Roman"/>
+              </a:rPr>
               <a:t>Friday December 05</a:t>
             </a:r>
             <a:r>
-              <a:rPr lang="en-US" baseline="30000" dirty="0" smtClean="0"/>
+              <a:rPr lang="en-US" baseline="30000" dirty="0" smtClean="0">
+                <a:latin typeface="Times New Roman"/>
+                <a:cs typeface="Times New Roman"/>
+              </a:rPr>
               <a:t>st</a:t>
             </a:r>
             <a:r>
-              <a:rPr lang="en-US" dirty="0"/>
+              <a:rPr lang="en-US" dirty="0">
+                <a:latin typeface="Times New Roman"/>
+                <a:cs typeface="Times New Roman"/>
+              </a:rPr>
               <a:t>, </a:t>
             </a:r>
             <a:r>
-              <a:rPr lang="en-US" dirty="0" smtClean="0"/>
+              <a:rPr lang="en-US" dirty="0" smtClean="0">
+                <a:latin typeface="Times New Roman"/>
+                <a:cs typeface="Times New Roman"/>
+              </a:rPr>
               <a:t>2014 </a:t>
             </a:r>
-            <a:endParaRPr lang="en-US" dirty="0" smtClean="0"/>
-          </a:p>
-          <a:p>
-            <a:endParaRPr lang="en-US" dirty="0"/>
-          </a:p>
-          <a:p>
-            <a:r>
-              <a:rPr lang="en-US" dirty="0" smtClean="0"/>
+          </a:p>
+          <a:p>
+            <a:endParaRPr lang="en-US" dirty="0">
+              <a:latin typeface="Times New Roman"/>
+              <a:cs typeface="Times New Roman"/>
+            </a:endParaRPr>
+          </a:p>
+          <a:p>
+            <a:r>
+              <a:rPr lang="en-US" dirty="0" smtClean="0">
+                <a:latin typeface="Times New Roman"/>
+                <a:cs typeface="Times New Roman"/>
+              </a:rPr>
               <a:t>Applications must </a:t>
             </a:r>
             <a:r>
-              <a:rPr lang="en-US" dirty="0"/>
+              <a:rPr lang="en-US" dirty="0">
+                <a:latin typeface="Times New Roman"/>
+                <a:cs typeface="Times New Roman"/>
+              </a:rPr>
               <a:t>be sent by email to Sharon Elder at pireundergrads@gmail.com. </a:t>
             </a:r>
           </a:p>
@@ -4942,7 +5761,7 @@
 </p:sld>
 </file>
 
-<file path=ppt/slides/slide12.xml><?xml version="1.0" encoding="utf-8"?>
+<file path=ppt/slides/slide14.xml><?xml version="1.0" encoding="utf-8"?>
 <p:sld xmlns:a="http://schemas.openxmlformats.org/drawingml/2006/main" xmlns:r="http://schemas.openxmlformats.org/officeDocument/2006/relationships" xmlns:p="http://schemas.openxmlformats.org/presentationml/2006/main">
   <p:cSld>
     <p:spTree>
@@ -4969,16 +5788,27 @@
             <p:ph type="title"/>
           </p:nvPr>
         </p:nvSpPr>
-        <p:spPr/>
+        <p:spPr>
+          <a:xfrm>
+            <a:off x="457200" y="-76200"/>
+            <a:ext cx="8229600" cy="1143000"/>
+          </a:xfrm>
+        </p:spPr>
         <p:txBody>
           <a:bodyPr/>
           <a:lstStyle/>
           <a:p>
             <a:r>
-              <a:rPr lang="en-US" dirty="0" smtClean="0"/>
-              <a:t>Visit the PIRE Website!</a:t>
-            </a:r>
-            <a:endParaRPr lang="en-US" dirty="0"/>
+              <a:rPr lang="en-US" b="1" dirty="0" smtClean="0">
+                <a:latin typeface="Times New Roman"/>
+                <a:cs typeface="Times New Roman"/>
+              </a:rPr>
+              <a:t>PIRE Faculty</a:t>
+            </a:r>
+            <a:endParaRPr lang="en-US" b="1" dirty="0">
+              <a:latin typeface="Times New Roman"/>
+              <a:cs typeface="Times New Roman"/>
+            </a:endParaRPr>
           </a:p>
         </p:txBody>
       </p:sp>
@@ -4992,47 +5822,483 @@
             <p:ph idx="1"/>
           </p:nvPr>
         </p:nvSpPr>
-        <p:spPr/>
-        <p:txBody>
-          <a:bodyPr/>
-          <a:lstStyle/>
-          <a:p>
-            <a:pPr algn="ctr">
+        <p:spPr>
+          <a:xfrm>
+            <a:off x="457200" y="990600"/>
+            <a:ext cx="8915400" cy="5867400"/>
+          </a:xfrm>
+        </p:spPr>
+        <p:txBody>
+          <a:bodyPr>
+            <a:normAutofit lnSpcReduction="10000"/>
+          </a:bodyPr>
+          <a:lstStyle/>
+          <a:p>
+            <a:pPr>
               <a:buNone/>
             </a:pPr>
-            <a:endParaRPr lang="en-US" dirty="0" smtClean="0">
-              <a:hlinkClick r:id="rId3"/>
+            <a:r>
+              <a:rPr lang="en-US" sz="2000" b="1" dirty="0" smtClean="0">
+                <a:latin typeface="Times New Roman"/>
+                <a:cs typeface="Times New Roman"/>
+              </a:rPr>
+              <a:t> </a:t>
+            </a:r>
+            <a:endParaRPr lang="en-US" sz="2000" dirty="0">
+              <a:latin typeface="Times New Roman"/>
+              <a:cs typeface="Times New Roman"/>
             </a:endParaRPr>
           </a:p>
           <a:p>
-            <a:pPr algn="ctr">
+            <a:pPr marL="0" indent="0">
               <a:buNone/>
             </a:pPr>
             <a:r>
-              <a:rPr lang="en-US" dirty="0" smtClean="0">
-                <a:hlinkClick r:id="rId3"/>
-              </a:rPr>
-              <a:t>http://cls.psu.edu/PIRE/</a:t>
-            </a:r>
-            <a:endParaRPr lang="en-US" dirty="0" smtClean="0"/>
-          </a:p>
-          <a:p>
-            <a:pPr algn="ctr">
+              <a:rPr lang="en-US" sz="2000" dirty="0" smtClean="0">
+                <a:solidFill>
+                  <a:srgbClr val="0000FF"/>
+                </a:solidFill>
+                <a:latin typeface="Times New Roman"/>
+                <a:cs typeface="Times New Roman"/>
+              </a:rPr>
+              <a:t>Communication, Sciences </a:t>
+            </a:r>
+            <a:r>
+              <a:rPr lang="en-US" sz="2000" dirty="0">
+                <a:solidFill>
+                  <a:srgbClr val="0000FF"/>
+                </a:solidFill>
+                <a:latin typeface="Times New Roman"/>
+                <a:cs typeface="Times New Roman"/>
+              </a:rPr>
+              <a:t>&amp; Disorders       </a:t>
+            </a:r>
+            <a:r>
+              <a:rPr lang="en-US" sz="2000" dirty="0" smtClean="0">
+                <a:solidFill>
+                  <a:srgbClr val="0000FF"/>
+                </a:solidFill>
+                <a:latin typeface="Times New Roman"/>
+                <a:cs typeface="Times New Roman"/>
+              </a:rPr>
+              <a:t>	Psychology</a:t>
+            </a:r>
+            <a:endParaRPr lang="en-US" sz="2000" dirty="0">
+              <a:solidFill>
+                <a:srgbClr val="0000FF"/>
+              </a:solidFill>
+              <a:latin typeface="Times New Roman"/>
+              <a:cs typeface="Times New Roman"/>
+            </a:endParaRPr>
+          </a:p>
+          <a:p>
+            <a:pPr marL="0" indent="0">
               <a:buNone/>
             </a:pPr>
-            <a:endParaRPr lang="en-US" dirty="0"/>
+            <a:r>
+              <a:rPr lang="en-US" sz="2000" dirty="0" smtClean="0">
+                <a:latin typeface="Times New Roman"/>
+                <a:cs typeface="Times New Roman"/>
+              </a:rPr>
+              <a:t>Carol Miller				Michele Diaz</a:t>
+            </a:r>
+          </a:p>
+          <a:p>
+            <a:pPr marL="0" indent="0">
+              <a:buNone/>
+            </a:pPr>
+            <a:r>
+              <a:rPr lang="en-US" sz="2000" dirty="0" smtClean="0">
+                <a:solidFill>
+                  <a:srgbClr val="0000FF"/>
+                </a:solidFill>
+                <a:latin typeface="Times New Roman"/>
+                <a:cs typeface="Times New Roman"/>
+              </a:rPr>
+              <a:t>					</a:t>
+            </a:r>
+            <a:r>
+              <a:rPr lang="en-US" sz="2000" dirty="0" smtClean="0">
+                <a:solidFill>
+                  <a:srgbClr val="000000"/>
+                </a:solidFill>
+                <a:latin typeface="Times New Roman"/>
+                <a:cs typeface="Times New Roman"/>
+              </a:rPr>
+              <a:t>Judy Kroll</a:t>
+            </a:r>
+            <a:endParaRPr lang="en-US" sz="2000" dirty="0" smtClean="0">
+              <a:solidFill>
+                <a:srgbClr val="0000FF"/>
+              </a:solidFill>
+              <a:latin typeface="Times New Roman"/>
+              <a:cs typeface="Times New Roman"/>
+            </a:endParaRPr>
+          </a:p>
+          <a:p>
+            <a:pPr marL="0" indent="0">
+              <a:buNone/>
+            </a:pPr>
+            <a:r>
+              <a:rPr lang="en-US" sz="2000" dirty="0" smtClean="0">
+                <a:solidFill>
+                  <a:srgbClr val="0000FF"/>
+                </a:solidFill>
+                <a:latin typeface="Times New Roman"/>
+                <a:cs typeface="Times New Roman"/>
+              </a:rPr>
+              <a:t>French					</a:t>
+            </a:r>
+            <a:r>
+              <a:rPr lang="en-US" sz="2000" dirty="0" smtClean="0">
+                <a:solidFill>
+                  <a:srgbClr val="000000"/>
+                </a:solidFill>
+                <a:latin typeface="Times New Roman"/>
+                <a:cs typeface="Times New Roman"/>
+              </a:rPr>
+              <a:t>Ping Li</a:t>
+            </a:r>
+            <a:r>
+              <a:rPr lang="en-US" sz="2000" dirty="0" smtClean="0">
+                <a:solidFill>
+                  <a:srgbClr val="0000FF"/>
+                </a:solidFill>
+                <a:latin typeface="Times New Roman"/>
+                <a:cs typeface="Times New Roman"/>
+              </a:rPr>
+              <a:t>			</a:t>
+            </a:r>
+          </a:p>
+          <a:p>
+            <a:pPr marL="0" indent="0">
+              <a:buNone/>
+            </a:pPr>
+            <a:r>
+              <a:rPr lang="en-US" sz="2000" dirty="0" smtClean="0">
+                <a:latin typeface="Times New Roman"/>
+                <a:cs typeface="Times New Roman"/>
+              </a:rPr>
+              <a:t>Marc </a:t>
+            </a:r>
+            <a:r>
+              <a:rPr lang="en-US" sz="2000" dirty="0" err="1" smtClean="0">
+                <a:latin typeface="Times New Roman"/>
+                <a:cs typeface="Times New Roman"/>
+              </a:rPr>
+              <a:t>Authier</a:t>
+            </a:r>
+            <a:r>
+              <a:rPr lang="en-US" sz="2000" dirty="0" smtClean="0">
+                <a:latin typeface="Times New Roman"/>
+                <a:cs typeface="Times New Roman"/>
+              </a:rPr>
+              <a:t>				Janet van Hell</a:t>
+            </a:r>
+            <a:endParaRPr lang="en-US" sz="2000" dirty="0">
+              <a:latin typeface="Times New Roman"/>
+              <a:cs typeface="Times New Roman"/>
+            </a:endParaRPr>
+          </a:p>
+          <a:p>
+            <a:pPr marL="0" indent="0">
+              <a:buNone/>
+            </a:pPr>
+            <a:r>
+              <a:rPr lang="en-US" sz="2000" dirty="0" smtClean="0">
+                <a:latin typeface="Times New Roman"/>
+                <a:cs typeface="Times New Roman"/>
+              </a:rPr>
+              <a:t>Lisa Reed				Dan Weiss</a:t>
+            </a:r>
+          </a:p>
+          <a:p>
+            <a:pPr marL="0" indent="0">
+              <a:buNone/>
+            </a:pPr>
+            <a:r>
+              <a:rPr lang="en-US" sz="2000" dirty="0">
+                <a:solidFill>
+                  <a:srgbClr val="0000FF"/>
+                </a:solidFill>
+                <a:latin typeface="Times New Roman"/>
+                <a:cs typeface="Times New Roman"/>
+              </a:rPr>
+              <a:t>	</a:t>
+            </a:r>
+            <a:r>
+              <a:rPr lang="en-US" sz="2000" dirty="0" smtClean="0">
+                <a:solidFill>
+                  <a:srgbClr val="0000FF"/>
+                </a:solidFill>
+                <a:latin typeface="Times New Roman"/>
+                <a:cs typeface="Times New Roman"/>
+              </a:rPr>
+              <a:t>				</a:t>
+            </a:r>
+          </a:p>
+          <a:p>
+            <a:pPr marL="0" indent="0">
+              <a:buNone/>
+            </a:pPr>
+            <a:r>
+              <a:rPr lang="en-US" sz="2000" dirty="0">
+                <a:solidFill>
+                  <a:srgbClr val="0000FF"/>
+                </a:solidFill>
+                <a:latin typeface="Times New Roman"/>
+                <a:cs typeface="Times New Roman"/>
+              </a:rPr>
+              <a:t>	</a:t>
+            </a:r>
+            <a:r>
+              <a:rPr lang="en-US" sz="2000" dirty="0" smtClean="0">
+                <a:solidFill>
+                  <a:srgbClr val="0000FF"/>
+                </a:solidFill>
+                <a:latin typeface="Times New Roman"/>
+                <a:cs typeface="Times New Roman"/>
+              </a:rPr>
+              <a:t>				Spanish</a:t>
+            </a:r>
+          </a:p>
+          <a:p>
+            <a:pPr marL="0" indent="0">
+              <a:buNone/>
+            </a:pPr>
+            <a:r>
+              <a:rPr lang="en-US" sz="2000" dirty="0" smtClean="0">
+                <a:solidFill>
+                  <a:srgbClr val="0000FF"/>
+                </a:solidFill>
+                <a:latin typeface="Times New Roman"/>
+                <a:cs typeface="Times New Roman"/>
+              </a:rPr>
+              <a:t>German					</a:t>
+            </a:r>
+            <a:r>
+              <a:rPr lang="en-US" sz="2000" dirty="0" smtClean="0">
+                <a:solidFill>
+                  <a:srgbClr val="000000"/>
+                </a:solidFill>
+                <a:latin typeface="Times New Roman"/>
+                <a:cs typeface="Times New Roman"/>
+              </a:rPr>
+              <a:t>Matt Carlson</a:t>
+            </a:r>
+            <a:endParaRPr lang="en-US" sz="2000" dirty="0" smtClean="0">
+              <a:solidFill>
+                <a:srgbClr val="0000FF"/>
+              </a:solidFill>
+              <a:latin typeface="Times New Roman"/>
+              <a:cs typeface="Times New Roman"/>
+            </a:endParaRPr>
+          </a:p>
+          <a:p>
+            <a:pPr marL="0" indent="0">
+              <a:buNone/>
+            </a:pPr>
+            <a:r>
+              <a:rPr lang="en-US" sz="2000" dirty="0" smtClean="0">
+                <a:solidFill>
+                  <a:srgbClr val="000000"/>
+                </a:solidFill>
+                <a:latin typeface="Times New Roman"/>
+                <a:cs typeface="Times New Roman"/>
+              </a:rPr>
+              <a:t>Carrie Jackson				Giuli Dussias			</a:t>
+            </a:r>
+            <a:endParaRPr lang="en-US" sz="2000" dirty="0">
+              <a:solidFill>
+                <a:srgbClr val="000000"/>
+              </a:solidFill>
+              <a:latin typeface="Times New Roman"/>
+              <a:cs typeface="Times New Roman"/>
+            </a:endParaRPr>
+          </a:p>
+          <a:p>
+            <a:pPr marL="0" indent="0">
+              <a:buNone/>
+            </a:pPr>
+            <a:r>
+              <a:rPr lang="en-US" sz="2000" dirty="0" smtClean="0">
+                <a:solidFill>
+                  <a:srgbClr val="000000"/>
+                </a:solidFill>
+                <a:latin typeface="Times New Roman"/>
+                <a:cs typeface="Times New Roman"/>
+              </a:rPr>
+              <a:t>Mike Putnam				John Lipski		</a:t>
+            </a:r>
+          </a:p>
+          <a:p>
+            <a:pPr marL="0" indent="0">
+              <a:buNone/>
+            </a:pPr>
+            <a:r>
+              <a:rPr lang="en-US" sz="2000" dirty="0" smtClean="0">
+                <a:solidFill>
+                  <a:srgbClr val="000000"/>
+                </a:solidFill>
+                <a:latin typeface="Times New Roman"/>
+                <a:cs typeface="Times New Roman"/>
+              </a:rPr>
+              <a:t>Richard Page				Karen Miller</a:t>
+            </a:r>
+          </a:p>
+          <a:p>
+            <a:pPr marL="0" indent="0">
+              <a:buNone/>
+            </a:pPr>
+            <a:r>
+              <a:rPr lang="en-US" sz="2000" dirty="0" smtClean="0">
+                <a:solidFill>
+                  <a:srgbClr val="0000FF"/>
+                </a:solidFill>
+                <a:latin typeface="Times New Roman"/>
+                <a:cs typeface="Times New Roman"/>
+              </a:rPr>
+              <a:t>					</a:t>
+            </a:r>
+            <a:r>
+              <a:rPr lang="en-US" sz="2000" dirty="0" smtClean="0">
+                <a:solidFill>
+                  <a:srgbClr val="000000"/>
+                </a:solidFill>
+                <a:latin typeface="Times New Roman"/>
+                <a:cs typeface="Times New Roman"/>
+              </a:rPr>
+              <a:t>Marianna </a:t>
+            </a:r>
+            <a:r>
+              <a:rPr lang="en-US" sz="2000" dirty="0" err="1" smtClean="0">
+                <a:solidFill>
+                  <a:srgbClr val="000000"/>
+                </a:solidFill>
+                <a:latin typeface="Times New Roman"/>
+                <a:cs typeface="Times New Roman"/>
+              </a:rPr>
+              <a:t>Nadeu</a:t>
+            </a:r>
+            <a:endParaRPr lang="en-US" sz="2000" dirty="0" smtClean="0">
+              <a:solidFill>
+                <a:srgbClr val="0000FF"/>
+              </a:solidFill>
+              <a:latin typeface="Times New Roman"/>
+              <a:cs typeface="Times New Roman"/>
+            </a:endParaRPr>
+          </a:p>
+          <a:p>
+            <a:pPr marL="0" indent="0">
+              <a:buNone/>
+            </a:pPr>
+            <a:r>
+              <a:rPr lang="en-US" sz="2000" dirty="0" smtClean="0">
+                <a:solidFill>
+                  <a:srgbClr val="0000FF"/>
+                </a:solidFill>
+                <a:latin typeface="Times New Roman"/>
+                <a:cs typeface="Times New Roman"/>
+              </a:rPr>
+              <a:t>Linguistics				</a:t>
+            </a:r>
+            <a:r>
+              <a:rPr lang="en-US" sz="2000" dirty="0" smtClean="0">
+                <a:solidFill>
+                  <a:srgbClr val="000000"/>
+                </a:solidFill>
+                <a:latin typeface="Times New Roman"/>
+                <a:cs typeface="Times New Roman"/>
+              </a:rPr>
+              <a:t>Rena Torres </a:t>
+            </a:r>
+            <a:r>
+              <a:rPr lang="en-US" sz="2000" dirty="0" err="1" smtClean="0">
+                <a:solidFill>
+                  <a:srgbClr val="000000"/>
+                </a:solidFill>
+                <a:latin typeface="Times New Roman"/>
+                <a:cs typeface="Times New Roman"/>
+              </a:rPr>
+              <a:t>Cacoullos</a:t>
+            </a:r>
+            <a:endParaRPr lang="en-US" sz="2000" dirty="0" smtClean="0">
+              <a:solidFill>
+                <a:srgbClr val="000000"/>
+              </a:solidFill>
+              <a:latin typeface="Times New Roman"/>
+              <a:cs typeface="Times New Roman"/>
+            </a:endParaRPr>
+          </a:p>
+          <a:p>
+            <a:pPr marL="0" indent="0">
+              <a:buNone/>
+            </a:pPr>
+            <a:r>
+              <a:rPr lang="en-US" sz="2000" dirty="0" err="1" smtClean="0">
+                <a:solidFill>
+                  <a:srgbClr val="000000"/>
+                </a:solidFill>
+                <a:latin typeface="Times New Roman"/>
+                <a:cs typeface="Times New Roman"/>
+              </a:rPr>
+              <a:t>Eleonora</a:t>
+            </a:r>
+            <a:r>
+              <a:rPr lang="en-US" sz="2000" dirty="0" smtClean="0">
+                <a:solidFill>
+                  <a:srgbClr val="000000"/>
+                </a:solidFill>
+                <a:latin typeface="Times New Roman"/>
+                <a:cs typeface="Times New Roman"/>
+              </a:rPr>
+              <a:t> Rossi</a:t>
+            </a:r>
+          </a:p>
+          <a:p>
+            <a:pPr marL="0" indent="0">
+              <a:buNone/>
+            </a:pPr>
+            <a:endParaRPr lang="en-US" sz="2000" dirty="0" smtClean="0">
+              <a:solidFill>
+                <a:srgbClr val="0000FF"/>
+              </a:solidFill>
+              <a:latin typeface="Times New Roman"/>
+              <a:cs typeface="Times New Roman"/>
+            </a:endParaRPr>
+          </a:p>
+          <a:p>
+            <a:pPr marL="0" indent="0">
+              <a:buNone/>
+            </a:pPr>
+            <a:endParaRPr lang="en-US" sz="2000" dirty="0" smtClean="0">
+              <a:latin typeface="Times New Roman"/>
+              <a:cs typeface="Times New Roman"/>
+            </a:endParaRPr>
           </a:p>
         </p:txBody>
       </p:sp>
     </p:spTree>
+    <p:extLst>
+      <p:ext uri="{BB962C8B-B14F-4D97-AF65-F5344CB8AC3E}">
+        <p14:creationId xmlns:p14="http://schemas.microsoft.com/office/powerpoint/2010/main" val="761447144"/>
+      </p:ext>
+    </p:extLst>
   </p:cSld>
   <p:clrMapOvr>
     <a:masterClrMapping/>
   </p:clrMapOvr>
+  <p:timing>
+    <p:tnLst>
+      <p:par>
+        <p:cTn xmlns:p14="http://schemas.microsoft.com/office/powerpoint/2010/main" id="1" dur="indefinite" restart="never" nodeType="tmRoot"/>
+      </p:par>
+    </p:tnLst>
+  </p:timing>
 </p:sld>
 </file>
 
-<file path=ppt/slides/slide13.xml><?xml version="1.0" encoding="utf-8"?>
+<file path=ppt/slides/slide15.xml><?xml version="1.0" encoding="utf-8"?>
 <p:sld xmlns:a="http://schemas.openxmlformats.org/drawingml/2006/main" xmlns:r="http://schemas.openxmlformats.org/officeDocument/2006/relationships" xmlns:p="http://schemas.openxmlformats.org/presentationml/2006/main">
   <p:cSld>
     <p:spTree>
@@ -5065,10 +6331,122 @@
           <a:lstStyle/>
           <a:p>
             <a:r>
-              <a:rPr lang="en-US" b="1" dirty="0" smtClean="0"/>
+              <a:rPr lang="en-US" dirty="0" smtClean="0">
+                <a:latin typeface="Times New Roman"/>
+                <a:cs typeface="Times New Roman"/>
+              </a:rPr>
+              <a:t>Visit the PIRE Website!</a:t>
+            </a:r>
+            <a:endParaRPr lang="en-US" dirty="0">
+              <a:latin typeface="Times New Roman"/>
+              <a:cs typeface="Times New Roman"/>
+            </a:endParaRPr>
+          </a:p>
+        </p:txBody>
+      </p:sp>
+      <p:sp>
+        <p:nvSpPr>
+          <p:cNvPr id="3" name="Content Placeholder 2"/>
+          <p:cNvSpPr>
+            <a:spLocks noGrp="1"/>
+          </p:cNvSpPr>
+          <p:nvPr>
+            <p:ph idx="1"/>
+          </p:nvPr>
+        </p:nvSpPr>
+        <p:spPr/>
+        <p:txBody>
+          <a:bodyPr/>
+          <a:lstStyle/>
+          <a:p>
+            <a:pPr algn="ctr">
+              <a:buNone/>
+            </a:pPr>
+            <a:endParaRPr lang="en-US" dirty="0" smtClean="0">
+              <a:latin typeface="Times New Roman"/>
+              <a:cs typeface="Times New Roman"/>
+              <a:hlinkClick r:id="rId3"/>
+            </a:endParaRPr>
+          </a:p>
+          <a:p>
+            <a:pPr algn="ctr">
+              <a:buNone/>
+            </a:pPr>
+            <a:r>
+              <a:rPr lang="en-US" dirty="0" smtClean="0">
+                <a:latin typeface="Times New Roman"/>
+                <a:cs typeface="Times New Roman"/>
+                <a:hlinkClick r:id="rId3"/>
+              </a:rPr>
+              <a:t>http://cls.psu.edu/PIRE/</a:t>
+            </a:r>
+            <a:endParaRPr lang="en-US" dirty="0" smtClean="0">
+              <a:latin typeface="Times New Roman"/>
+              <a:cs typeface="Times New Roman"/>
+            </a:endParaRPr>
+          </a:p>
+          <a:p>
+            <a:pPr algn="ctr">
+              <a:buNone/>
+            </a:pPr>
+            <a:endParaRPr lang="en-US" dirty="0">
+              <a:latin typeface="Times New Roman"/>
+              <a:cs typeface="Times New Roman"/>
+            </a:endParaRPr>
+          </a:p>
+        </p:txBody>
+      </p:sp>
+    </p:spTree>
+  </p:cSld>
+  <p:clrMapOvr>
+    <a:masterClrMapping/>
+  </p:clrMapOvr>
+</p:sld>
+</file>
+
+<file path=ppt/slides/slide16.xml><?xml version="1.0" encoding="utf-8"?>
+<p:sld xmlns:a="http://schemas.openxmlformats.org/drawingml/2006/main" xmlns:r="http://schemas.openxmlformats.org/officeDocument/2006/relationships" xmlns:p="http://schemas.openxmlformats.org/presentationml/2006/main">
+  <p:cSld>
+    <p:spTree>
+      <p:nvGrpSpPr>
+        <p:cNvPr id="1" name=""/>
+        <p:cNvGrpSpPr/>
+        <p:nvPr/>
+      </p:nvGrpSpPr>
+      <p:grpSpPr>
+        <a:xfrm>
+          <a:off x="0" y="0"/>
+          <a:ext cx="0" cy="0"/>
+          <a:chOff x="0" y="0"/>
+          <a:chExt cx="0" cy="0"/>
+        </a:xfrm>
+      </p:grpSpPr>
+      <p:sp>
+        <p:nvSpPr>
+          <p:cNvPr id="2" name="Title 1"/>
+          <p:cNvSpPr>
+            <a:spLocks noGrp="1"/>
+          </p:cNvSpPr>
+          <p:nvPr>
+            <p:ph type="title"/>
+          </p:nvPr>
+        </p:nvSpPr>
+        <p:spPr/>
+        <p:txBody>
+          <a:bodyPr/>
+          <a:lstStyle/>
+          <a:p>
+            <a:r>
+              <a:rPr lang="en-US" b="1" dirty="0" smtClean="0">
+                <a:latin typeface="Times New Roman"/>
+                <a:cs typeface="Times New Roman"/>
+              </a:rPr>
               <a:t>Questions?</a:t>
             </a:r>
-            <a:endParaRPr lang="en-US" b="1" dirty="0"/>
+            <a:endParaRPr lang="en-US" b="1" dirty="0">
+              <a:latin typeface="Times New Roman"/>
+              <a:cs typeface="Times New Roman"/>
+            </a:endParaRPr>
           </a:p>
         </p:txBody>
       </p:sp>
@@ -5093,13 +6471,22 @@
               <a:buNone/>
             </a:pPr>
             <a:r>
-              <a:rPr lang="en-US" b="1" dirty="0" smtClean="0"/>
+              <a:rPr lang="en-US" b="1" dirty="0" smtClean="0">
+                <a:latin typeface="Times New Roman"/>
+                <a:cs typeface="Times New Roman"/>
+              </a:rPr>
               <a:t> </a:t>
             </a:r>
-            <a:endParaRPr lang="en-US" dirty="0"/>
-          </a:p>
-          <a:p>
-            <a:endParaRPr lang="en-US" dirty="0"/>
+            <a:endParaRPr lang="en-US" dirty="0">
+              <a:latin typeface="Times New Roman"/>
+              <a:cs typeface="Times New Roman"/>
+            </a:endParaRPr>
+          </a:p>
+          <a:p>
+            <a:endParaRPr lang="en-US" dirty="0">
+              <a:latin typeface="Times New Roman"/>
+              <a:cs typeface="Times New Roman"/>
+            </a:endParaRPr>
           </a:p>
         </p:txBody>
       </p:sp>
@@ -5137,180 +6524,336 @@
       </p:grpSpPr>
       <p:sp>
         <p:nvSpPr>
-          <p:cNvPr id="2" name="Title 1"/>
-          <p:cNvSpPr>
-            <a:spLocks noGrp="1"/>
-          </p:cNvSpPr>
-          <p:nvPr>
-            <p:ph type="title"/>
-          </p:nvPr>
-        </p:nvSpPr>
-        <p:spPr/>
-        <p:txBody>
-          <a:bodyPr/>
-          <a:lstStyle/>
-          <a:p>
-            <a:r>
-              <a:rPr lang="en-US" b="1" dirty="0" smtClean="0"/>
-              <a:t>What is PIRE?</a:t>
-            </a:r>
-            <a:endParaRPr lang="en-US" b="1" dirty="0"/>
-          </a:p>
-        </p:txBody>
-      </p:sp>
-      <p:sp>
-        <p:nvSpPr>
-          <p:cNvPr id="3" name="Content Placeholder 2"/>
-          <p:cNvSpPr>
-            <a:spLocks noGrp="1"/>
-          </p:cNvSpPr>
-          <p:nvPr>
-            <p:ph idx="1"/>
-          </p:nvPr>
-        </p:nvSpPr>
-        <p:spPr/>
-        <p:txBody>
-          <a:bodyPr>
-            <a:normAutofit fontScale="70000" lnSpcReduction="20000"/>
-          </a:bodyPr>
-          <a:lstStyle/>
-          <a:p>
-            <a:r>
-              <a:rPr lang="en-US" dirty="0" smtClean="0"/>
-              <a:t>PIRE:  </a:t>
-            </a:r>
-            <a:r>
-              <a:rPr lang="en-US" i="1" dirty="0"/>
-              <a:t>Partnerships for International Research and </a:t>
-            </a:r>
-            <a:r>
-              <a:rPr lang="en-US" i="1" dirty="0" smtClean="0"/>
-              <a:t>Education (National Science Foundation: </a:t>
-            </a:r>
-          </a:p>
-          <a:p>
-            <a:pPr>
-              <a:buNone/>
-            </a:pPr>
-            <a:endParaRPr lang="en-US" i="1" dirty="0"/>
-          </a:p>
-          <a:p>
-            <a:pPr>
-              <a:buNone/>
-            </a:pPr>
-            <a:r>
-              <a:rPr lang="en-US" i="1" dirty="0" smtClean="0">
-                <a:hlinkClick r:id="rId3"/>
-              </a:rPr>
-              <a:t>http://www.nsf.gov/funding/pgm_summ.jsp?pims_id=12819</a:t>
-            </a:r>
-            <a:endParaRPr lang="en-US" i="1" dirty="0" smtClean="0"/>
-          </a:p>
-          <a:p>
-            <a:pPr>
-              <a:buNone/>
-            </a:pPr>
-            <a:endParaRPr lang="en-US" dirty="0" smtClean="0"/>
-          </a:p>
-          <a:p>
-            <a:r>
-              <a:rPr lang="en-US" dirty="0" smtClean="0"/>
-              <a:t>Awarded to Penn States’ Center for Language Science  in 2010 (through 2015) </a:t>
-            </a:r>
-            <a:r>
-              <a:rPr lang="en-US" dirty="0" smtClean="0">
-                <a:hlinkClick r:id="rId4"/>
-              </a:rPr>
-              <a:t>http://cls.psu.edu/</a:t>
-            </a:r>
-            <a:endParaRPr lang="en-US" dirty="0" smtClean="0"/>
-          </a:p>
-          <a:p>
-            <a:endParaRPr lang="en-US" dirty="0" smtClean="0"/>
-          </a:p>
-          <a:p>
-            <a:r>
-              <a:rPr lang="en-US" dirty="0" smtClean="0"/>
-              <a:t>Our </a:t>
-            </a:r>
-            <a:r>
-              <a:rPr lang="en-US" dirty="0"/>
-              <a:t>PIRE </a:t>
-            </a:r>
-            <a:r>
-              <a:rPr lang="en-US" dirty="0" smtClean="0"/>
-              <a:t>grant: </a:t>
-            </a:r>
-            <a:r>
-              <a:rPr lang="en-US" b="1" i="1" dirty="0" smtClean="0"/>
-              <a:t>Bilingualism</a:t>
-            </a:r>
-            <a:r>
-              <a:rPr lang="en-US" b="1" i="1" dirty="0"/>
-              <a:t>, mind, and brain: An interdisciplinary program in cognitive psychology, linguistics, and cognitive </a:t>
-            </a:r>
-            <a:r>
-              <a:rPr lang="en-US" b="1" i="1" dirty="0" smtClean="0"/>
-              <a:t>neuroscience</a:t>
-            </a:r>
-            <a:endParaRPr lang="en-US" b="1" dirty="0" smtClean="0"/>
-          </a:p>
-          <a:p>
-            <a:endParaRPr lang="en-US" b="1" dirty="0"/>
-          </a:p>
-        </p:txBody>
-      </p:sp>
-      <p:sp>
-        <p:nvSpPr>
-          <p:cNvPr id="4" name="Rectangle 3"/>
-          <p:cNvSpPr/>
+          <p:cNvPr id="14338" name="Text Box 4"/>
+          <p:cNvSpPr txBox="1">
+            <a:spLocks noChangeArrowheads="1"/>
+          </p:cNvSpPr>
           <p:nvPr/>
         </p:nvSpPr>
-        <p:spPr>
+        <p:spPr bwMode="auto">
           <a:xfrm>
-            <a:off x="381000" y="1295400"/>
-            <a:ext cx="8077200" cy="4876800"/>
+            <a:off x="304800" y="117694"/>
+            <a:ext cx="8534400" cy="6511706"/>
           </a:xfrm>
           <a:prstGeom prst="rect">
             <a:avLst/>
           </a:prstGeom>
           <a:noFill/>
-          <a:ln>
+          <a:ln w="57150" cmpd="thickThin">
             <a:solidFill>
-              <a:srgbClr val="FF0000"/>
+              <a:srgbClr val="660066"/>
             </a:solidFill>
+            <a:miter lim="800000"/>
+            <a:headEnd/>
+            <a:tailEnd/>
           </a:ln>
         </p:spPr>
-        <p:style>
-          <a:lnRef idx="2">
-            <a:schemeClr val="accent1">
-              <a:shade val="50000"/>
-            </a:schemeClr>
-          </a:lnRef>
-          <a:fillRef idx="1">
-            <a:schemeClr val="accent1"/>
-          </a:fillRef>
-          <a:effectRef idx="0">
-            <a:schemeClr val="accent1"/>
-          </a:effectRef>
-          <a:fontRef idx="minor">
-            <a:schemeClr val="lt1"/>
-          </a:fontRef>
-        </p:style>
-        <p:txBody>
-          <a:bodyPr rtlCol="0" anchor="ctr"/>
+        <p:txBody>
+          <a:bodyPr wrap="square">
+            <a:prstTxWarp prst="textNoShape">
+              <a:avLst/>
+            </a:prstTxWarp>
+            <a:normAutofit/>
+          </a:bodyPr>
           <a:lstStyle/>
           <a:p>
             <a:pPr algn="ctr"/>
-            <a:endParaRPr lang="en-US" dirty="0">
-              <a:solidFill>
-                <a:srgbClr val="FF0000"/>
-              </a:solidFill>
-            </a:endParaRPr>
-          </a:p>
-        </p:txBody>
-      </p:sp>
+            <a:r>
+              <a:rPr lang="en-US" sz="2400" b="1" dirty="0" smtClean="0"/>
+              <a:t>PIRE: Partnerships for International Research and Education:</a:t>
+            </a:r>
+          </a:p>
+          <a:p>
+            <a:pPr algn="ctr"/>
+            <a:endParaRPr lang="en-US" sz="1000" b="1" dirty="0" smtClean="0"/>
+          </a:p>
+          <a:p>
+            <a:pPr algn="ctr"/>
+            <a:r>
+              <a:rPr lang="en-US" sz="2000" dirty="0" smtClean="0"/>
+              <a:t> OISE-0968369: </a:t>
+            </a:r>
+            <a:r>
+              <a:rPr lang="en-US" sz="2000" i="1" dirty="0" smtClean="0"/>
+              <a:t>Bilingualism, mind, and brain: </a:t>
+            </a:r>
+          </a:p>
+          <a:p>
+            <a:pPr algn="ctr"/>
+            <a:r>
+              <a:rPr lang="en-US" sz="2000" i="1" dirty="0" smtClean="0"/>
+              <a:t>An interdisciplinary program in cognitive psychology, linguistics, </a:t>
+            </a:r>
+          </a:p>
+          <a:p>
+            <a:pPr algn="ctr"/>
+            <a:r>
+              <a:rPr lang="en-US" sz="2000" i="1" dirty="0" smtClean="0"/>
+              <a:t>and cognitive neuroscience</a:t>
+            </a:r>
+          </a:p>
+          <a:p>
+            <a:pPr algn="ctr"/>
+            <a:r>
+              <a:rPr lang="en-US" sz="2000" dirty="0" smtClean="0"/>
+              <a:t>(2010-2015)</a:t>
+            </a:r>
+            <a:br>
+              <a:rPr lang="en-US" sz="2000" dirty="0" smtClean="0"/>
+            </a:br>
+            <a:endParaRPr lang="en-US" sz="2000" dirty="0" smtClean="0"/>
+          </a:p>
+          <a:p>
+            <a:pPr algn="ctr"/>
+            <a:r>
+              <a:rPr lang="en-US" sz="2000" dirty="0" smtClean="0"/>
+              <a:t>Pennsylvania State University</a:t>
+            </a:r>
+          </a:p>
+          <a:p>
+            <a:pPr algn="ctr"/>
+            <a:endParaRPr lang="en-US" dirty="0" smtClean="0"/>
+          </a:p>
+          <a:p>
+            <a:pPr algn="ctr"/>
+            <a:r>
+              <a:rPr lang="en-US" dirty="0" smtClean="0"/>
+              <a:t>    </a:t>
+            </a:r>
+            <a:r>
+              <a:rPr lang="en-US" sz="2200" dirty="0" smtClean="0"/>
+              <a:t>PI:    Judith Kroll</a:t>
+            </a:r>
+          </a:p>
+          <a:p>
+            <a:pPr algn="ctr"/>
+            <a:r>
+              <a:rPr lang="en-US" sz="2200" dirty="0" smtClean="0"/>
+              <a:t>Co-PIs:  Giuli Dussias</a:t>
+            </a:r>
+          </a:p>
+          <a:p>
+            <a:pPr algn="ctr"/>
+            <a:r>
+              <a:rPr lang="en-US" sz="2200" dirty="0" smtClean="0"/>
+              <a:t>			    Janet van Hell</a:t>
+            </a:r>
+            <a:r>
+              <a:rPr lang="en-US" dirty="0" smtClean="0"/>
+              <a:t>  </a:t>
+            </a:r>
+          </a:p>
+          <a:p>
+            <a:pPr algn="ctr"/>
+            <a:endParaRPr lang="en-US" dirty="0" smtClean="0"/>
+          </a:p>
+          <a:p>
+            <a:pPr algn="ctr"/>
+            <a:endParaRPr lang="en-US" dirty="0" smtClean="0"/>
+          </a:p>
+          <a:p>
+            <a:pPr algn="ctr"/>
+            <a:endParaRPr lang="en-US" dirty="0" smtClean="0"/>
+          </a:p>
+          <a:p>
+            <a:pPr algn="ctr"/>
+            <a:endParaRPr lang="en-US" dirty="0" smtClean="0"/>
+          </a:p>
+          <a:p>
+            <a:pPr algn="ctr"/>
+            <a:endParaRPr lang="en-US" dirty="0" smtClean="0"/>
+          </a:p>
+          <a:p>
+            <a:pPr algn="ctr"/>
+            <a:r>
+              <a:rPr lang="en-US" sz="2800" dirty="0"/>
+              <a:t>Center for Language Science</a:t>
+            </a:r>
+          </a:p>
+          <a:p>
+            <a:pPr algn="ctr"/>
+            <a:r>
+              <a:rPr lang="en-US" sz="2800" dirty="0"/>
+              <a:t>(</a:t>
+            </a:r>
+            <a:r>
+              <a:rPr lang="en-US" sz="2800" dirty="0">
+                <a:hlinkClick r:id="rId3"/>
+              </a:rPr>
+              <a:t>http://</a:t>
+            </a:r>
+            <a:r>
+              <a:rPr lang="en-US" sz="2800" dirty="0" smtClean="0">
+                <a:hlinkClick r:id="rId3"/>
+              </a:rPr>
+              <a:t>cls.psu.edu/PIRE</a:t>
+            </a:r>
+            <a:r>
+              <a:rPr lang="en-US" sz="2800" dirty="0"/>
+              <a:t>)</a:t>
+            </a:r>
+          </a:p>
+          <a:p>
+            <a:pPr algn="ctr"/>
+            <a:endParaRPr lang="en-US" sz="2800" dirty="0" smtClean="0"/>
+          </a:p>
+          <a:p>
+            <a:pPr algn="ctr"/>
+            <a:endParaRPr lang="en-US" dirty="0"/>
+          </a:p>
+        </p:txBody>
+      </p:sp>
+      <p:sp>
+        <p:nvSpPr>
+          <p:cNvPr id="14339" name="Rectangle 6"/>
+          <p:cNvSpPr>
+            <a:spLocks noChangeArrowheads="1"/>
+          </p:cNvSpPr>
+          <p:nvPr/>
+        </p:nvSpPr>
+        <p:spPr bwMode="auto">
+          <a:xfrm>
+            <a:off x="393700" y="6246813"/>
+            <a:ext cx="184150" cy="457200"/>
+          </a:xfrm>
+          <a:prstGeom prst="rect">
+            <a:avLst/>
+          </a:prstGeom>
+          <a:noFill/>
+          <a:ln w="9525">
+            <a:noFill/>
+            <a:miter lim="800000"/>
+            <a:headEnd/>
+            <a:tailEnd/>
+          </a:ln>
+        </p:spPr>
+        <p:txBody>
+          <a:bodyPr wrap="none">
+            <a:prstTxWarp prst="textNoShape">
+              <a:avLst/>
+            </a:prstTxWarp>
+            <a:spAutoFit/>
+          </a:bodyPr>
+          <a:lstStyle/>
+          <a:p>
+            <a:endParaRPr lang="en-US" dirty="0"/>
+          </a:p>
+        </p:txBody>
+      </p:sp>
+      <p:pic>
+        <p:nvPicPr>
+          <p:cNvPr id="12" name="Picture 11" descr="Picture 2.png"/>
+          <p:cNvPicPr>
+            <a:picLocks noChangeAspect="1"/>
+          </p:cNvPicPr>
+          <p:nvPr/>
+        </p:nvPicPr>
+        <p:blipFill>
+          <a:blip r:embed="rId4"/>
+          <a:stretch>
+            <a:fillRect/>
+          </a:stretch>
+        </p:blipFill>
+        <p:spPr>
+          <a:xfrm>
+            <a:off x="609600" y="2743200"/>
+            <a:ext cx="1390476" cy="1942857"/>
+          </a:xfrm>
+          <a:prstGeom prst="rect">
+            <a:avLst/>
+          </a:prstGeom>
+        </p:spPr>
+      </p:pic>
+      <p:pic>
+        <p:nvPicPr>
+          <p:cNvPr id="13" name="Picture 12" descr="Picture 2.png"/>
+          <p:cNvPicPr>
+            <a:picLocks noChangeAspect="1"/>
+          </p:cNvPicPr>
+          <p:nvPr/>
+        </p:nvPicPr>
+        <p:blipFill>
+          <a:blip r:embed="rId4"/>
+          <a:stretch>
+            <a:fillRect/>
+          </a:stretch>
+        </p:blipFill>
+        <p:spPr>
+          <a:xfrm>
+            <a:off x="7086600" y="2743200"/>
+            <a:ext cx="1390476" cy="1942857"/>
+          </a:xfrm>
+          <a:prstGeom prst="rect">
+            <a:avLst/>
+          </a:prstGeom>
+        </p:spPr>
+      </p:pic>
+      <p:pic>
+        <p:nvPicPr>
+          <p:cNvPr id="6" name="Picture 5" descr="Screen shot 2013-08-30 at 12.40.11 AM.png"/>
+          <p:cNvPicPr>
+            <a:picLocks noChangeAspect="1"/>
+          </p:cNvPicPr>
+          <p:nvPr/>
+        </p:nvPicPr>
+        <p:blipFill>
+          <a:blip r:embed="rId5">
+            <a:extLst>
+              <a:ext uri="{28A0092B-C50C-407E-A947-70E740481C1C}">
+                <a14:useLocalDpi xmlns:a14="http://schemas.microsoft.com/office/drawing/2010/main" val="0"/>
+              </a:ext>
+            </a:extLst>
+          </a:blip>
+          <a:stretch>
+            <a:fillRect/>
+          </a:stretch>
+        </p:blipFill>
+        <p:spPr>
+          <a:xfrm>
+            <a:off x="762000" y="5029200"/>
+            <a:ext cx="889000" cy="1257300"/>
+          </a:xfrm>
+          <a:prstGeom prst="rect">
+            <a:avLst/>
+          </a:prstGeom>
+        </p:spPr>
+      </p:pic>
+      <p:pic>
+        <p:nvPicPr>
+          <p:cNvPr id="7" name="Picture 6" descr="Screen shot 2013-08-30 at 12.40.11 AM.png"/>
+          <p:cNvPicPr>
+            <a:picLocks noChangeAspect="1"/>
+          </p:cNvPicPr>
+          <p:nvPr/>
+        </p:nvPicPr>
+        <p:blipFill>
+          <a:blip r:embed="rId5">
+            <a:extLst>
+              <a:ext uri="{28A0092B-C50C-407E-A947-70E740481C1C}">
+                <a14:useLocalDpi xmlns:a14="http://schemas.microsoft.com/office/drawing/2010/main" val="0"/>
+              </a:ext>
+            </a:extLst>
+          </a:blip>
+          <a:stretch>
+            <a:fillRect/>
+          </a:stretch>
+        </p:blipFill>
+        <p:spPr>
+          <a:xfrm>
+            <a:off x="7467600" y="4953000"/>
+            <a:ext cx="889000" cy="1257300"/>
+          </a:xfrm>
+          <a:prstGeom prst="rect">
+            <a:avLst/>
+          </a:prstGeom>
+        </p:spPr>
+      </p:pic>
     </p:spTree>
+    <p:extLst>
+      <p:ext uri="{BB962C8B-B14F-4D97-AF65-F5344CB8AC3E}">
+        <p14:creationId xmlns:p14="http://schemas.microsoft.com/office/powerpoint/2010/main" val="534305820"/>
+      </p:ext>
+    </p:extLst>
   </p:cSld>
   <p:clrMapOvr>
     <a:masterClrMapping/>
@@ -5342,285 +6885,220 @@
           <a:chExt cx="0" cy="0"/>
         </a:xfrm>
       </p:grpSpPr>
-      <p:sp>
-        <p:nvSpPr>
-          <p:cNvPr id="2" name="Title 1"/>
-          <p:cNvSpPr>
-            <a:spLocks noGrp="1"/>
-          </p:cNvSpPr>
-          <p:nvPr>
-            <p:ph type="title"/>
-          </p:nvPr>
-        </p:nvSpPr>
-        <p:spPr>
+      <p:pic>
+        <p:nvPicPr>
+          <p:cNvPr id="9" name="Picture 5" descr="images-2.jpeg"/>
+          <p:cNvPicPr>
+            <a:picLocks noChangeAspect="1"/>
+          </p:cNvPicPr>
+          <p:nvPr/>
+        </p:nvPicPr>
+        <p:blipFill>
+          <a:blip r:embed="rId3"/>
+          <a:srcRect/>
+          <a:stretch>
+            <a:fillRect/>
+          </a:stretch>
+        </p:blipFill>
+        <p:spPr bwMode="auto">
           <a:xfrm>
-            <a:off x="457200" y="-152400"/>
-            <a:ext cx="8229600" cy="1143000"/>
-          </a:xfrm>
-        </p:spPr>
-        <p:txBody>
-          <a:bodyPr/>
-          <a:lstStyle/>
-          <a:p>
-            <a:r>
-              <a:rPr lang="en-US" b="1" dirty="0" smtClean="0"/>
-              <a:t>What is PIRE?</a:t>
-            </a:r>
-            <a:endParaRPr lang="en-US" b="1" dirty="0"/>
-          </a:p>
-        </p:txBody>
-      </p:sp>
-      <p:sp>
-        <p:nvSpPr>
-          <p:cNvPr id="3" name="Content Placeholder 2"/>
-          <p:cNvSpPr>
-            <a:spLocks noGrp="1"/>
-          </p:cNvSpPr>
-          <p:nvPr>
-            <p:ph idx="1"/>
-          </p:nvPr>
-        </p:nvSpPr>
-        <p:spPr>
-          <a:xfrm>
-            <a:off x="152400" y="1066800"/>
-            <a:ext cx="8991600" cy="5562600"/>
-          </a:xfrm>
-        </p:spPr>
-        <p:txBody>
-          <a:bodyPr>
-            <a:normAutofit fontScale="62500" lnSpcReduction="20000"/>
-          </a:bodyPr>
-          <a:lstStyle/>
-          <a:p>
-            <a:pPr>
-              <a:buNone/>
-            </a:pPr>
-            <a:r>
-              <a:rPr lang="en-US" b="1" dirty="0" smtClean="0"/>
-              <a:t> </a:t>
-            </a:r>
-            <a:endParaRPr lang="en-US" b="1" dirty="0"/>
-          </a:p>
-          <a:p>
-            <a:r>
-              <a:rPr lang="en-US" dirty="0" smtClean="0"/>
-              <a:t>Allows for the </a:t>
-            </a:r>
-            <a:r>
-              <a:rPr lang="en-US" dirty="0"/>
-              <a:t>creation of international research opportunities for qualified undergraduate students working on language research, who have had research experience with CLS faculty. </a:t>
-            </a:r>
-            <a:endParaRPr lang="en-US" dirty="0" smtClean="0"/>
-          </a:p>
-          <a:p>
-            <a:endParaRPr lang="en-US" dirty="0"/>
-          </a:p>
-          <a:p>
-            <a:r>
-              <a:rPr lang="en-US" b="1" dirty="0" smtClean="0"/>
-              <a:t>8</a:t>
-            </a:r>
-            <a:r>
-              <a:rPr lang="en-US" dirty="0" smtClean="0"/>
-              <a:t> undergraduate </a:t>
-            </a:r>
-            <a:r>
-              <a:rPr lang="en-US" dirty="0"/>
-              <a:t>students </a:t>
-            </a:r>
-            <a:r>
-              <a:rPr lang="en-US" dirty="0" smtClean="0"/>
-              <a:t>(U.S. citizens) and </a:t>
-            </a:r>
-            <a:r>
-              <a:rPr lang="en-US" b="1" dirty="0" smtClean="0"/>
-              <a:t>1 </a:t>
-            </a:r>
-            <a:r>
-              <a:rPr lang="en-US" dirty="0" smtClean="0"/>
-              <a:t>undergraduate student (international student in the College of Liberal Arts)</a:t>
-            </a:r>
-            <a:r>
-              <a:rPr lang="en-US" b="1" dirty="0" smtClean="0"/>
-              <a:t> </a:t>
-            </a:r>
-            <a:r>
-              <a:rPr lang="en-US" dirty="0" smtClean="0"/>
-              <a:t>will receive </a:t>
-            </a:r>
-            <a:r>
-              <a:rPr lang="en-US" dirty="0"/>
-              <a:t>funding to conduct innovative research on bilingualism at leading collaborating institutions in Europe and </a:t>
-            </a:r>
-            <a:r>
-              <a:rPr lang="en-US" dirty="0" smtClean="0"/>
-              <a:t>Asia:</a:t>
-            </a:r>
-          </a:p>
-          <a:p>
-            <a:pPr>
-              <a:buNone/>
-            </a:pPr>
-            <a:endParaRPr lang="en-US" dirty="0" smtClean="0"/>
-          </a:p>
-          <a:p>
-            <a:r>
-              <a:rPr lang="en-US" dirty="0" smtClean="0"/>
-              <a:t>Beijing </a:t>
-            </a:r>
-            <a:r>
-              <a:rPr lang="en-US" dirty="0"/>
-              <a:t>Normal University (Beijing, China); </a:t>
-            </a:r>
-            <a:endParaRPr lang="en-US" dirty="0" smtClean="0"/>
-          </a:p>
-          <a:p>
-            <a:r>
-              <a:rPr lang="en-US" dirty="0" smtClean="0"/>
-              <a:t>University </a:t>
-            </a:r>
-            <a:r>
-              <a:rPr lang="en-US" dirty="0"/>
-              <a:t>of Hong Kong (</a:t>
-            </a:r>
-            <a:r>
-              <a:rPr lang="en-US" dirty="0" smtClean="0"/>
-              <a:t>China)</a:t>
-            </a:r>
-          </a:p>
-          <a:p>
-            <a:r>
-              <a:rPr lang="en-US" dirty="0" smtClean="0"/>
-              <a:t>Mannheim University (Mannheim Germany)</a:t>
-            </a:r>
-          </a:p>
-          <a:p>
-            <a:r>
-              <a:rPr lang="en-US" dirty="0" smtClean="0"/>
-              <a:t>Radboud </a:t>
-            </a:r>
-            <a:r>
-              <a:rPr lang="en-US" dirty="0"/>
-              <a:t>University (Nijmegen, The </a:t>
-            </a:r>
-            <a:r>
-              <a:rPr lang="en-US" dirty="0" smtClean="0"/>
-              <a:t>Netherlands)</a:t>
-            </a:r>
-          </a:p>
-          <a:p>
-            <a:r>
-              <a:rPr lang="en-US" dirty="0" smtClean="0"/>
-              <a:t>University </a:t>
-            </a:r>
-            <a:r>
-              <a:rPr lang="en-US" dirty="0"/>
-              <a:t>of Granada (Granada, </a:t>
-            </a:r>
-            <a:r>
-              <a:rPr lang="en-US" dirty="0" smtClean="0"/>
-              <a:t>Spain)</a:t>
-            </a:r>
-          </a:p>
-          <a:p>
-            <a:r>
-              <a:rPr lang="en-US" dirty="0" smtClean="0"/>
-              <a:t>Universitat </a:t>
-            </a:r>
-            <a:r>
-              <a:rPr lang="en-US" dirty="0"/>
-              <a:t>Rovira i Virgili (Tarragona, </a:t>
-            </a:r>
-            <a:r>
-              <a:rPr lang="en-US" dirty="0" smtClean="0"/>
-              <a:t>Spain)</a:t>
-            </a:r>
-          </a:p>
-          <a:p>
-            <a:r>
-              <a:rPr lang="en-US" dirty="0" smtClean="0"/>
-              <a:t>Bangor </a:t>
-            </a:r>
-            <a:r>
-              <a:rPr lang="en-US" dirty="0"/>
-              <a:t>University (Wales, UK</a:t>
-            </a:r>
-            <a:r>
-              <a:rPr lang="en-US" dirty="0" smtClean="0"/>
-              <a:t>) </a:t>
-            </a:r>
-          </a:p>
-          <a:p>
-            <a:r>
-              <a:rPr lang="en-US" dirty="0" smtClean="0"/>
-              <a:t>Lund </a:t>
-            </a:r>
-            <a:r>
-              <a:rPr lang="en-US" dirty="0"/>
-              <a:t>University (Lund, </a:t>
-            </a:r>
-            <a:r>
-              <a:rPr lang="en-US" dirty="0" smtClean="0"/>
-              <a:t>Sweden)</a:t>
-            </a:r>
-            <a:endParaRPr lang="en-US" dirty="0"/>
-          </a:p>
-          <a:p>
-            <a:endParaRPr lang="en-US" dirty="0"/>
-          </a:p>
-        </p:txBody>
-      </p:sp>
-      <p:sp>
-        <p:nvSpPr>
-          <p:cNvPr id="4" name="Rectangle 3"/>
-          <p:cNvSpPr/>
-          <p:nvPr/>
-        </p:nvSpPr>
-        <p:spPr>
-          <a:xfrm>
-            <a:off x="76200" y="1295400"/>
-            <a:ext cx="8991600" cy="5257800"/>
+            <a:off x="6096000" y="2209800"/>
+            <a:ext cx="2133600" cy="1978025"/>
           </a:xfrm>
           <a:prstGeom prst="rect">
             <a:avLst/>
           </a:prstGeom>
           <a:noFill/>
-          <a:ln>
-            <a:solidFill>
-              <a:srgbClr val="FF0000"/>
-            </a:solidFill>
+          <a:ln w="9525">
+            <a:noFill/>
+            <a:miter lim="800000"/>
+            <a:headEnd/>
+            <a:tailEnd/>
           </a:ln>
         </p:spPr>
-        <p:style>
-          <a:lnRef idx="2">
-            <a:schemeClr val="accent1">
-              <a:shade val="50000"/>
-            </a:schemeClr>
-          </a:lnRef>
-          <a:fillRef idx="1">
-            <a:schemeClr val="accent1"/>
-          </a:fillRef>
-          <a:effectRef idx="0">
-            <a:schemeClr val="accent1"/>
-          </a:effectRef>
-          <a:fontRef idx="minor">
-            <a:schemeClr val="lt1"/>
-          </a:fontRef>
-        </p:style>
-        <p:txBody>
-          <a:bodyPr rtlCol="0" anchor="ctr"/>
-          <a:lstStyle/>
-          <a:p>
-            <a:pPr algn="ctr"/>
+      </p:pic>
+      <p:pic>
+        <p:nvPicPr>
+          <p:cNvPr id="10" name="Picture 6" descr="mapUS3n.jpg"/>
+          <p:cNvPicPr>
+            <a:picLocks noChangeAspect="1"/>
+          </p:cNvPicPr>
+          <p:nvPr/>
+        </p:nvPicPr>
+        <p:blipFill>
+          <a:blip r:embed="rId4"/>
+          <a:srcRect/>
+          <a:stretch>
+            <a:fillRect/>
+          </a:stretch>
+        </p:blipFill>
+        <p:spPr bwMode="auto">
+          <a:xfrm>
+            <a:off x="685800" y="2514600"/>
+            <a:ext cx="2743200" cy="1755775"/>
+          </a:xfrm>
+          <a:prstGeom prst="rect">
+            <a:avLst/>
+          </a:prstGeom>
+          <a:noFill/>
+          <a:ln w="9525">
+            <a:noFill/>
+            <a:miter lim="800000"/>
+            <a:headEnd/>
+            <a:tailEnd/>
+          </a:ln>
+        </p:spPr>
+      </p:pic>
+      <p:sp>
+        <p:nvSpPr>
+          <p:cNvPr id="11" name="5-Point Star 10"/>
+          <p:cNvSpPr/>
+          <p:nvPr/>
+        </p:nvSpPr>
+        <p:spPr bwMode="auto">
+          <a:xfrm>
+            <a:off x="2743200" y="2971800"/>
+            <a:ext cx="381000" cy="304800"/>
+          </a:xfrm>
+          <a:prstGeom prst="star5">
+            <a:avLst/>
+          </a:prstGeom>
+          <a:solidFill>
+            <a:srgbClr val="FF0000"/>
+          </a:solidFill>
+          <a:ln w="9525" cap="flat" cmpd="sng" algn="ctr">
+            <a:solidFill>
+              <a:schemeClr val="tx1"/>
+            </a:solidFill>
+            <a:prstDash val="solid"/>
+            <a:round/>
+            <a:headEnd type="none" w="med" len="med"/>
+            <a:tailEnd type="none" w="med" len="med"/>
+          </a:ln>
+          <a:effectLst/>
+        </p:spPr>
+        <p:txBody>
+          <a:bodyPr>
+            <a:prstTxWarp prst="textNoShape">
+              <a:avLst/>
+            </a:prstTxWarp>
+          </a:bodyPr>
+          <a:lstStyle/>
+          <a:p>
+            <a:pPr>
+              <a:defRPr/>
+            </a:pPr>
             <a:endParaRPr lang="en-US" dirty="0">
-              <a:solidFill>
-                <a:srgbClr val="FF0000"/>
-              </a:solidFill>
+              <a:latin typeface="Times" pitchFamily="-106" charset="0"/>
             </a:endParaRPr>
           </a:p>
         </p:txBody>
       </p:sp>
+      <p:sp>
+        <p:nvSpPr>
+          <p:cNvPr id="12" name="AutoShape 1034"/>
+          <p:cNvSpPr>
+            <a:spLocks noChangeArrowheads="1"/>
+          </p:cNvSpPr>
+          <p:nvPr/>
+        </p:nvSpPr>
+        <p:spPr bwMode="auto">
+          <a:xfrm>
+            <a:off x="3657600" y="2743200"/>
+            <a:ext cx="2362200" cy="381000"/>
+          </a:xfrm>
+          <a:prstGeom prst="curvedDownArrow">
+            <a:avLst>
+              <a:gd name="adj1" fmla="val 48911"/>
+              <a:gd name="adj2" fmla="val 97765"/>
+              <a:gd name="adj3" fmla="val 33333"/>
+            </a:avLst>
+          </a:prstGeom>
+          <a:solidFill>
+            <a:srgbClr val="FF0000"/>
+          </a:solidFill>
+          <a:ln w="9525">
+            <a:solidFill>
+              <a:schemeClr val="tx1"/>
+            </a:solidFill>
+            <a:miter lim="800000"/>
+            <a:headEnd/>
+            <a:tailEnd/>
+          </a:ln>
+        </p:spPr>
+        <p:txBody>
+          <a:bodyPr wrap="none" anchor="ctr">
+            <a:prstTxWarp prst="textNoShape">
+              <a:avLst/>
+            </a:prstTxWarp>
+          </a:bodyPr>
+          <a:lstStyle/>
+          <a:p>
+            <a:endParaRPr lang="en-US" dirty="0">
+              <a:latin typeface="Comic Sans MS" pitchFamily="-108" charset="0"/>
+              <a:ea typeface="Comic Sans MS" pitchFamily="-108" charset="0"/>
+              <a:cs typeface="Comic Sans MS" pitchFamily="-108" charset="0"/>
+            </a:endParaRPr>
+          </a:p>
+        </p:txBody>
+      </p:sp>
+      <p:sp>
+        <p:nvSpPr>
+          <p:cNvPr id="14" name="TextBox 8"/>
+          <p:cNvSpPr txBox="1">
+            <a:spLocks noChangeArrowheads="1"/>
+          </p:cNvSpPr>
+          <p:nvPr/>
+        </p:nvSpPr>
+        <p:spPr bwMode="auto">
+          <a:xfrm>
+            <a:off x="381000" y="381000"/>
+            <a:ext cx="6586909" cy="707886"/>
+          </a:xfrm>
+          <a:prstGeom prst="rect">
+            <a:avLst/>
+          </a:prstGeom>
+          <a:noFill/>
+          <a:ln w="9525">
+            <a:noFill/>
+            <a:miter lim="800000"/>
+            <a:headEnd/>
+            <a:tailEnd/>
+          </a:ln>
+        </p:spPr>
+        <p:txBody>
+          <a:bodyPr wrap="none">
+            <a:prstTxWarp prst="textNoShape">
+              <a:avLst/>
+            </a:prstTxWarp>
+            <a:spAutoFit/>
+          </a:bodyPr>
+          <a:lstStyle/>
+          <a:p>
+            <a:r>
+              <a:rPr lang="en-US" sz="2000" i="1" dirty="0"/>
+              <a:t>Bilingualism takes different forms in different </a:t>
+            </a:r>
+            <a:r>
+              <a:rPr lang="en-US" sz="2000" i="1" dirty="0" smtClean="0"/>
+              <a:t>places and that</a:t>
+            </a:r>
+          </a:p>
+          <a:p>
+            <a:r>
+              <a:rPr lang="en-US" sz="2000" i="1" dirty="0" smtClean="0"/>
+              <a:t>requires collaborations here in the US and abroad:</a:t>
+            </a:r>
+            <a:endParaRPr lang="en-US" sz="2000" i="1" dirty="0"/>
+          </a:p>
+        </p:txBody>
+      </p:sp>
     </p:spTree>
+    <p:extLst>
+      <p:ext uri="{BB962C8B-B14F-4D97-AF65-F5344CB8AC3E}">
+        <p14:creationId xmlns:p14="http://schemas.microsoft.com/office/powerpoint/2010/main" val="1603626025"/>
+      </p:ext>
+    </p:extLst>
   </p:cSld>
   <p:clrMapOvr>
     <a:masterClrMapping/>
@@ -5662,104 +7140,179 @@
             <p:ph type="title"/>
           </p:nvPr>
         </p:nvSpPr>
-        <p:spPr>
-          <a:xfrm>
-            <a:off x="457200" y="76200"/>
-            <a:ext cx="8229600" cy="1143000"/>
-          </a:xfrm>
-        </p:spPr>
+        <p:spPr/>
+        <p:txBody>
+          <a:bodyPr/>
+          <a:lstStyle/>
+          <a:p>
+            <a:r>
+              <a:rPr lang="en-US" b="1" dirty="0" smtClean="0">
+                <a:latin typeface="Times New Roman"/>
+                <a:cs typeface="Times New Roman"/>
+              </a:rPr>
+              <a:t>What is PIRE?</a:t>
+            </a:r>
+            <a:endParaRPr lang="en-US" b="1" dirty="0">
+              <a:latin typeface="Times New Roman"/>
+              <a:cs typeface="Times New Roman"/>
+            </a:endParaRPr>
+          </a:p>
+        </p:txBody>
+      </p:sp>
+      <p:sp>
+        <p:nvSpPr>
+          <p:cNvPr id="3" name="Content Placeholder 2"/>
+          <p:cNvSpPr>
+            <a:spLocks noGrp="1"/>
+          </p:cNvSpPr>
+          <p:nvPr>
+            <p:ph idx="1"/>
+          </p:nvPr>
+        </p:nvSpPr>
+        <p:spPr/>
         <p:txBody>
           <a:bodyPr>
-            <a:normAutofit fontScale="90000"/>
+            <a:normAutofit fontScale="77500" lnSpcReduction="20000"/>
           </a:bodyPr>
           <a:lstStyle/>
           <a:p>
             <a:r>
-              <a:rPr lang="en-US" b="1" dirty="0" smtClean="0"/>
-              <a:t>What does a PIRE fellowship cover?</a:t>
-            </a:r>
-            <a:endParaRPr lang="en-US" b="1" dirty="0"/>
-          </a:p>
-        </p:txBody>
-      </p:sp>
-      <p:sp>
-        <p:nvSpPr>
-          <p:cNvPr id="3" name="Content Placeholder 2"/>
-          <p:cNvSpPr>
-            <a:spLocks noGrp="1"/>
-          </p:cNvSpPr>
-          <p:nvPr>
-            <p:ph idx="1"/>
-          </p:nvPr>
-        </p:nvSpPr>
-        <p:spPr/>
-        <p:txBody>
-          <a:bodyPr>
-            <a:normAutofit/>
-          </a:bodyPr>
-          <a:lstStyle/>
+              <a:rPr lang="en-US" dirty="0" smtClean="0">
+                <a:latin typeface="Times New Roman"/>
+                <a:cs typeface="Times New Roman"/>
+              </a:rPr>
+              <a:t>PIRE:  </a:t>
+            </a:r>
+            <a:r>
+              <a:rPr lang="en-US" i="1" dirty="0">
+                <a:latin typeface="Times New Roman"/>
+                <a:cs typeface="Times New Roman"/>
+              </a:rPr>
+              <a:t>Partnerships for International Research and </a:t>
+            </a:r>
+            <a:r>
+              <a:rPr lang="en-US" i="1" dirty="0" smtClean="0">
+                <a:latin typeface="Times New Roman"/>
+                <a:cs typeface="Times New Roman"/>
+              </a:rPr>
+              <a:t>Education (National Science Foundation: </a:t>
+            </a:r>
+          </a:p>
           <a:p>
             <a:pPr>
               <a:buNone/>
             </a:pPr>
-            <a:r>
-              <a:rPr lang="en-US" b="1" dirty="0" smtClean="0"/>
-              <a:t> </a:t>
-            </a:r>
-            <a:endParaRPr lang="en-US" b="1" dirty="0"/>
-          </a:p>
-          <a:p>
-            <a:r>
-              <a:rPr lang="en-US" dirty="0" smtClean="0"/>
-              <a:t>All expense-paid trip (</a:t>
-            </a:r>
-            <a:r>
-              <a:rPr lang="en-US" sz="2400" dirty="0" smtClean="0"/>
-              <a:t>expenses cannot exceed the PIRE budgeted amounts</a:t>
-            </a:r>
-            <a:r>
-              <a:rPr lang="en-US" dirty="0" smtClean="0"/>
-              <a:t>):</a:t>
-            </a:r>
-          </a:p>
-          <a:p>
-            <a:pPr lvl="1"/>
-            <a:r>
-              <a:rPr lang="en-US" dirty="0" smtClean="0"/>
-              <a:t>Airfare</a:t>
-            </a:r>
-          </a:p>
-          <a:p>
-            <a:pPr lvl="1"/>
-            <a:r>
-              <a:rPr lang="en-US" dirty="0" smtClean="0"/>
-              <a:t>Lodging</a:t>
-            </a:r>
-          </a:p>
-          <a:p>
-            <a:pPr lvl="1"/>
-            <a:r>
-              <a:rPr lang="en-US" dirty="0" smtClean="0"/>
-              <a:t>Meals and incidentals</a:t>
-            </a:r>
-          </a:p>
-          <a:p>
-            <a:pPr lvl="1"/>
-            <a:r>
-              <a:rPr lang="en-US" dirty="0" smtClean="0"/>
-              <a:t>Research expenses </a:t>
-            </a:r>
-          </a:p>
-          <a:p>
-            <a:pPr lvl="1"/>
-            <a:r>
-              <a:rPr lang="en-US" dirty="0" smtClean="0"/>
-              <a:t>Summer tuition (more on this later)</a:t>
-            </a:r>
-            <a:endParaRPr lang="en-US" dirty="0"/>
-          </a:p>
-          <a:p>
-            <a:endParaRPr lang="en-US" dirty="0"/>
+            <a:endParaRPr lang="en-US" i="1" dirty="0">
+              <a:latin typeface="Times New Roman"/>
+              <a:cs typeface="Times New Roman"/>
+            </a:endParaRPr>
+          </a:p>
+          <a:p>
+            <a:pPr>
+              <a:buNone/>
+            </a:pPr>
+            <a:r>
+              <a:rPr lang="en-US" i="1" dirty="0" smtClean="0">
+                <a:latin typeface="Times New Roman"/>
+                <a:cs typeface="Times New Roman"/>
+                <a:hlinkClick r:id="rId3"/>
+              </a:rPr>
+              <a:t>http://www.nsf.gov/funding/pgm_summ.jsp?pims_id=12819</a:t>
+            </a:r>
+            <a:endParaRPr lang="en-US" i="1" dirty="0" smtClean="0">
+              <a:latin typeface="Times New Roman"/>
+              <a:cs typeface="Times New Roman"/>
+            </a:endParaRPr>
+          </a:p>
+          <a:p>
+            <a:pPr>
+              <a:buNone/>
+            </a:pPr>
+            <a:endParaRPr lang="en-US" dirty="0" smtClean="0">
+              <a:latin typeface="Times New Roman"/>
+              <a:cs typeface="Times New Roman"/>
+            </a:endParaRPr>
+          </a:p>
+          <a:p>
+            <a:r>
+              <a:rPr lang="en-US" dirty="0" smtClean="0">
+                <a:latin typeface="Times New Roman"/>
+                <a:cs typeface="Times New Roman"/>
+              </a:rPr>
+              <a:t>Awarded to Penn States’ Center for Language Science  in 2010 (through 2015) </a:t>
+            </a:r>
+            <a:r>
+              <a:rPr lang="en-US" dirty="0" smtClean="0">
+                <a:latin typeface="Times New Roman"/>
+                <a:cs typeface="Times New Roman"/>
+                <a:hlinkClick r:id="rId4"/>
+              </a:rPr>
+              <a:t>http://cls.psu.edu/</a:t>
+            </a:r>
+            <a:endParaRPr lang="en-US" dirty="0" smtClean="0">
+              <a:latin typeface="Times New Roman"/>
+              <a:cs typeface="Times New Roman"/>
+            </a:endParaRPr>
+          </a:p>
+          <a:p>
+            <a:endParaRPr lang="en-US" dirty="0" smtClean="0">
+              <a:latin typeface="Times New Roman"/>
+              <a:cs typeface="Times New Roman"/>
+            </a:endParaRPr>
+          </a:p>
+          <a:p>
+            <a:r>
+              <a:rPr lang="en-US" dirty="0" smtClean="0">
+                <a:latin typeface="Times New Roman"/>
+                <a:cs typeface="Times New Roman"/>
+              </a:rPr>
+              <a:t>Our </a:t>
+            </a:r>
+            <a:r>
+              <a:rPr lang="en-US" dirty="0">
+                <a:latin typeface="Times New Roman"/>
+                <a:cs typeface="Times New Roman"/>
+              </a:rPr>
+              <a:t>PIRE </a:t>
+            </a:r>
+            <a:r>
+              <a:rPr lang="en-US" dirty="0" smtClean="0">
+                <a:latin typeface="Times New Roman"/>
+                <a:cs typeface="Times New Roman"/>
+              </a:rPr>
+              <a:t>grant: </a:t>
+            </a:r>
+            <a:r>
+              <a:rPr lang="en-US" b="1" i="1" dirty="0" smtClean="0">
+                <a:latin typeface="Times New Roman"/>
+                <a:cs typeface="Times New Roman"/>
+              </a:rPr>
+              <a:t>Bilingualism</a:t>
+            </a:r>
+            <a:r>
+              <a:rPr lang="en-US" b="1" i="1" dirty="0">
+                <a:latin typeface="Times New Roman"/>
+                <a:cs typeface="Times New Roman"/>
+              </a:rPr>
+              <a:t>, mind, and brain: An interdisciplinary program in cognitive psychology, linguistics, and cognitive </a:t>
+            </a:r>
+            <a:r>
+              <a:rPr lang="en-US" b="1" i="1" dirty="0" smtClean="0">
+                <a:latin typeface="Times New Roman"/>
+                <a:cs typeface="Times New Roman"/>
+              </a:rPr>
+              <a:t>neuroscience</a:t>
+            </a:r>
+            <a:endParaRPr lang="en-US" b="1" dirty="0" smtClean="0">
+              <a:latin typeface="Times New Roman"/>
+              <a:cs typeface="Times New Roman"/>
+            </a:endParaRPr>
+          </a:p>
+          <a:p>
+            <a:endParaRPr lang="en-US" b="1" dirty="0">
+              <a:latin typeface="Times New Roman"/>
+              <a:cs typeface="Times New Roman"/>
+            </a:endParaRPr>
           </a:p>
         </p:txBody>
       </p:sp>
@@ -5855,16 +7408,27 @@
             <p:ph type="title"/>
           </p:nvPr>
         </p:nvSpPr>
-        <p:spPr/>
+        <p:spPr>
+          <a:xfrm>
+            <a:off x="457200" y="-152400"/>
+            <a:ext cx="8229600" cy="1143000"/>
+          </a:xfrm>
+        </p:spPr>
         <p:txBody>
           <a:bodyPr/>
           <a:lstStyle/>
           <a:p>
             <a:r>
-              <a:rPr lang="en-US" b="1" dirty="0" smtClean="0"/>
-              <a:t>Who can apply?</a:t>
-            </a:r>
-            <a:endParaRPr lang="en-US" b="1" dirty="0"/>
+              <a:rPr lang="en-US" b="1" dirty="0" smtClean="0">
+                <a:latin typeface="Times New Roman"/>
+                <a:cs typeface="Times New Roman"/>
+              </a:rPr>
+              <a:t>What is PIRE?</a:t>
+            </a:r>
+            <a:endParaRPr lang="en-US" b="1" dirty="0">
+              <a:latin typeface="Times New Roman"/>
+              <a:cs typeface="Times New Roman"/>
+            </a:endParaRPr>
           </a:p>
         </p:txBody>
       </p:sp>
@@ -5878,10 +7442,15 @@
             <p:ph idx="1"/>
           </p:nvPr>
         </p:nvSpPr>
-        <p:spPr/>
+        <p:spPr>
+          <a:xfrm>
+            <a:off x="152400" y="1066800"/>
+            <a:ext cx="8991600" cy="5562600"/>
+          </a:xfrm>
+        </p:spPr>
         <p:txBody>
           <a:bodyPr>
-            <a:normAutofit fontScale="85000" lnSpcReduction="20000"/>
+            <a:normAutofit fontScale="62500" lnSpcReduction="20000"/>
           </a:bodyPr>
           <a:lstStyle/>
           <a:p>
@@ -5889,53 +7458,303 @@
               <a:buNone/>
             </a:pPr>
             <a:r>
-              <a:rPr lang="en-US" b="1" dirty="0" smtClean="0"/>
+              <a:rPr lang="en-US" b="1" dirty="0" smtClean="0">
+                <a:latin typeface="Times New Roman"/>
+                <a:cs typeface="Times New Roman"/>
+              </a:rPr>
               <a:t> </a:t>
             </a:r>
-            <a:endParaRPr lang="en-US" b="1" dirty="0"/>
-          </a:p>
-          <a:p>
-            <a:pPr lvl="0"/>
-            <a:r>
-              <a:rPr lang="en-US" dirty="0" smtClean="0"/>
-              <a:t>U.S. and non-U.S.citizens (the latter must be in the College of the Liberal Arts)</a:t>
-            </a:r>
-          </a:p>
-          <a:p>
-            <a:pPr lvl="0"/>
-            <a:endParaRPr lang="en-US" dirty="0"/>
-          </a:p>
-          <a:p>
-            <a:pPr lvl="0"/>
-            <a:r>
-              <a:rPr lang="en-US" dirty="0"/>
-              <a:t>Must conduct research for the proposed summer research experience that fits with the goals of the CLS PIRE </a:t>
-            </a:r>
-            <a:r>
-              <a:rPr lang="en-US" dirty="0" smtClean="0"/>
-              <a:t>project</a:t>
-            </a:r>
-          </a:p>
-          <a:p>
-            <a:pPr lvl="0">
+            <a:endParaRPr lang="en-US" b="1" dirty="0">
+              <a:latin typeface="Times New Roman"/>
+              <a:cs typeface="Times New Roman"/>
+            </a:endParaRPr>
+          </a:p>
+          <a:p>
+            <a:r>
+              <a:rPr lang="en-US" dirty="0" smtClean="0">
+                <a:latin typeface="Times New Roman"/>
+                <a:cs typeface="Times New Roman"/>
+              </a:rPr>
+              <a:t>Allows for the </a:t>
+            </a:r>
+            <a:r>
+              <a:rPr lang="en-US" dirty="0">
+                <a:latin typeface="Times New Roman"/>
+                <a:cs typeface="Times New Roman"/>
+              </a:rPr>
+              <a:t>creation of international research opportunities for qualified undergraduate students working on language research, who have had research experience with CLS faculty. </a:t>
+            </a:r>
+            <a:endParaRPr lang="en-US" dirty="0" smtClean="0">
+              <a:latin typeface="Times New Roman"/>
+              <a:cs typeface="Times New Roman"/>
+            </a:endParaRPr>
+          </a:p>
+          <a:p>
+            <a:endParaRPr lang="en-US" dirty="0">
+              <a:latin typeface="Times New Roman"/>
+              <a:cs typeface="Times New Roman"/>
+            </a:endParaRPr>
+          </a:p>
+          <a:p>
+            <a:r>
+              <a:rPr lang="en-US" b="1" dirty="0" smtClean="0">
+                <a:latin typeface="Times New Roman"/>
+                <a:cs typeface="Times New Roman"/>
+              </a:rPr>
+              <a:t>8</a:t>
+            </a:r>
+            <a:r>
+              <a:rPr lang="en-US" dirty="0" smtClean="0">
+                <a:latin typeface="Times New Roman"/>
+                <a:cs typeface="Times New Roman"/>
+              </a:rPr>
+              <a:t> undergraduate </a:t>
+            </a:r>
+            <a:r>
+              <a:rPr lang="en-US" dirty="0">
+                <a:latin typeface="Times New Roman"/>
+                <a:cs typeface="Times New Roman"/>
+              </a:rPr>
+              <a:t>students </a:t>
+            </a:r>
+            <a:r>
+              <a:rPr lang="en-US" dirty="0" smtClean="0">
+                <a:latin typeface="Times New Roman"/>
+                <a:cs typeface="Times New Roman"/>
+              </a:rPr>
+              <a:t>(U.S. citizens) and </a:t>
+            </a:r>
+            <a:r>
+              <a:rPr lang="en-US" b="1" dirty="0" smtClean="0">
+                <a:latin typeface="Times New Roman"/>
+                <a:cs typeface="Times New Roman"/>
+              </a:rPr>
+              <a:t>1 </a:t>
+            </a:r>
+            <a:r>
+              <a:rPr lang="en-US" dirty="0" smtClean="0">
+                <a:latin typeface="Times New Roman"/>
+                <a:cs typeface="Times New Roman"/>
+              </a:rPr>
+              <a:t>undergraduate student (international student in the College of Liberal Arts)</a:t>
+            </a:r>
+            <a:r>
+              <a:rPr lang="en-US" b="1" dirty="0" smtClean="0">
+                <a:latin typeface="Times New Roman"/>
+                <a:cs typeface="Times New Roman"/>
+              </a:rPr>
+              <a:t> </a:t>
+            </a:r>
+            <a:r>
+              <a:rPr lang="en-US" dirty="0" smtClean="0">
+                <a:latin typeface="Times New Roman"/>
+                <a:cs typeface="Times New Roman"/>
+              </a:rPr>
+              <a:t>will receive </a:t>
+            </a:r>
+            <a:r>
+              <a:rPr lang="en-US" dirty="0">
+                <a:latin typeface="Times New Roman"/>
+                <a:cs typeface="Times New Roman"/>
+              </a:rPr>
+              <a:t>funding to conduct innovative research on bilingualism at leading collaborating institutions in Europe and </a:t>
+            </a:r>
+            <a:r>
+              <a:rPr lang="en-US" dirty="0" smtClean="0">
+                <a:latin typeface="Times New Roman"/>
+                <a:cs typeface="Times New Roman"/>
+              </a:rPr>
+              <a:t>Asia:</a:t>
+            </a:r>
+          </a:p>
+          <a:p>
+            <a:pPr>
               <a:buNone/>
             </a:pPr>
-            <a:endParaRPr lang="en-US" dirty="0"/>
-          </a:p>
-          <a:p>
-            <a:r>
-              <a:rPr lang="en-US" dirty="0"/>
-              <a:t>Must have completed research experience with a CLS research faculty member </a:t>
-            </a:r>
-            <a:r>
-              <a:rPr lang="en-US" b="1" dirty="0"/>
-              <a:t>for at least one year prior to summer </a:t>
-            </a:r>
-            <a:r>
-              <a:rPr lang="en-US" b="1" dirty="0" smtClean="0"/>
-              <a:t>travel</a:t>
-            </a:r>
-            <a:endParaRPr lang="en-US" dirty="0"/>
+            <a:endParaRPr lang="en-US" dirty="0" smtClean="0">
+              <a:latin typeface="Times New Roman"/>
+              <a:cs typeface="Times New Roman"/>
+            </a:endParaRPr>
+          </a:p>
+          <a:p>
+            <a:r>
+              <a:rPr lang="en-US" dirty="0" smtClean="0">
+                <a:latin typeface="Times New Roman"/>
+                <a:cs typeface="Times New Roman"/>
+              </a:rPr>
+              <a:t>Beijing </a:t>
+            </a:r>
+            <a:r>
+              <a:rPr lang="en-US" dirty="0">
+                <a:latin typeface="Times New Roman"/>
+                <a:cs typeface="Times New Roman"/>
+              </a:rPr>
+              <a:t>Normal University (Beijing, China</a:t>
+            </a:r>
+            <a:r>
+              <a:rPr lang="en-US" dirty="0" smtClean="0">
+                <a:latin typeface="Times New Roman"/>
+                <a:cs typeface="Times New Roman"/>
+              </a:rPr>
+              <a:t>)</a:t>
+            </a:r>
+          </a:p>
+          <a:p>
+            <a:r>
+              <a:rPr lang="en-US" dirty="0" smtClean="0">
+                <a:latin typeface="Times New Roman"/>
+                <a:cs typeface="Times New Roman"/>
+              </a:rPr>
+              <a:t>University </a:t>
+            </a:r>
+            <a:r>
+              <a:rPr lang="en-US" dirty="0">
+                <a:latin typeface="Times New Roman"/>
+                <a:cs typeface="Times New Roman"/>
+              </a:rPr>
+              <a:t>of Hong Kong (</a:t>
+            </a:r>
+            <a:r>
+              <a:rPr lang="en-US" dirty="0" smtClean="0">
+                <a:latin typeface="Times New Roman"/>
+                <a:cs typeface="Times New Roman"/>
+              </a:rPr>
+              <a:t>China)</a:t>
+            </a:r>
+          </a:p>
+          <a:p>
+            <a:r>
+              <a:rPr lang="en-US" dirty="0" smtClean="0">
+                <a:latin typeface="Times New Roman"/>
+                <a:cs typeface="Times New Roman"/>
+              </a:rPr>
+              <a:t>Mannheim University (Mannheim Germany)</a:t>
+            </a:r>
+          </a:p>
+          <a:p>
+            <a:r>
+              <a:rPr lang="en-US" dirty="0" smtClean="0">
+                <a:latin typeface="Times New Roman"/>
+                <a:cs typeface="Times New Roman"/>
+              </a:rPr>
+              <a:t>Radboud </a:t>
+            </a:r>
+            <a:r>
+              <a:rPr lang="en-US" dirty="0">
+                <a:latin typeface="Times New Roman"/>
+                <a:cs typeface="Times New Roman"/>
+              </a:rPr>
+              <a:t>University (Nijmegen, The </a:t>
+            </a:r>
+            <a:r>
+              <a:rPr lang="en-US" dirty="0" smtClean="0">
+                <a:latin typeface="Times New Roman"/>
+                <a:cs typeface="Times New Roman"/>
+              </a:rPr>
+              <a:t>Netherlands)</a:t>
+            </a:r>
+          </a:p>
+          <a:p>
+            <a:r>
+              <a:rPr lang="en-US" dirty="0" smtClean="0">
+                <a:latin typeface="Times New Roman"/>
+                <a:cs typeface="Times New Roman"/>
+              </a:rPr>
+              <a:t>University </a:t>
+            </a:r>
+            <a:r>
+              <a:rPr lang="en-US" dirty="0">
+                <a:latin typeface="Times New Roman"/>
+                <a:cs typeface="Times New Roman"/>
+              </a:rPr>
+              <a:t>of Granada (Granada, </a:t>
+            </a:r>
+            <a:r>
+              <a:rPr lang="en-US" dirty="0" smtClean="0">
+                <a:latin typeface="Times New Roman"/>
+                <a:cs typeface="Times New Roman"/>
+              </a:rPr>
+              <a:t>Spain)</a:t>
+            </a:r>
+          </a:p>
+          <a:p>
+            <a:r>
+              <a:rPr lang="en-US" dirty="0" smtClean="0">
+                <a:latin typeface="Times New Roman"/>
+                <a:cs typeface="Times New Roman"/>
+              </a:rPr>
+              <a:t>Universitat </a:t>
+            </a:r>
+            <a:r>
+              <a:rPr lang="en-US" dirty="0">
+                <a:latin typeface="Times New Roman"/>
+                <a:cs typeface="Times New Roman"/>
+              </a:rPr>
+              <a:t>Rovira i Virgili (Tarragona, </a:t>
+            </a:r>
+            <a:r>
+              <a:rPr lang="en-US" dirty="0" smtClean="0">
+                <a:latin typeface="Times New Roman"/>
+                <a:cs typeface="Times New Roman"/>
+              </a:rPr>
+              <a:t>Spain)</a:t>
+            </a:r>
+          </a:p>
+          <a:p>
+            <a:r>
+              <a:rPr lang="en-US" dirty="0" smtClean="0">
+                <a:latin typeface="Times New Roman"/>
+                <a:cs typeface="Times New Roman"/>
+              </a:rPr>
+              <a:t>Bangor </a:t>
+            </a:r>
+            <a:r>
+              <a:rPr lang="en-US" dirty="0">
+                <a:latin typeface="Times New Roman"/>
+                <a:cs typeface="Times New Roman"/>
+              </a:rPr>
+              <a:t>University (Wales, UK</a:t>
+            </a:r>
+            <a:r>
+              <a:rPr lang="en-US" dirty="0" smtClean="0">
+                <a:latin typeface="Times New Roman"/>
+                <a:cs typeface="Times New Roman"/>
+              </a:rPr>
+              <a:t>) </a:t>
+            </a:r>
+          </a:p>
+          <a:p>
+            <a:r>
+              <a:rPr lang="en-US" dirty="0" smtClean="0">
+                <a:latin typeface="Times New Roman"/>
+                <a:cs typeface="Times New Roman"/>
+              </a:rPr>
+              <a:t>Lund </a:t>
+            </a:r>
+            <a:r>
+              <a:rPr lang="en-US" dirty="0">
+                <a:latin typeface="Times New Roman"/>
+                <a:cs typeface="Times New Roman"/>
+              </a:rPr>
+              <a:t>University (Lund, </a:t>
+            </a:r>
+            <a:r>
+              <a:rPr lang="en-US" dirty="0" smtClean="0">
+                <a:latin typeface="Times New Roman"/>
+                <a:cs typeface="Times New Roman"/>
+              </a:rPr>
+              <a:t>Sweden)</a:t>
+            </a:r>
+            <a:endParaRPr lang="en-US" dirty="0">
+              <a:latin typeface="Times New Roman"/>
+              <a:cs typeface="Times New Roman"/>
+            </a:endParaRPr>
+          </a:p>
+          <a:p>
+            <a:endParaRPr lang="en-US" dirty="0">
+              <a:latin typeface="Times New Roman"/>
+              <a:cs typeface="Times New Roman"/>
+            </a:endParaRPr>
           </a:p>
         </p:txBody>
       </p:sp>
@@ -5947,8 +7766,8 @@
         </p:nvSpPr>
         <p:spPr>
           <a:xfrm>
-            <a:off x="381000" y="1295400"/>
-            <a:ext cx="8458200" cy="4876800"/>
+            <a:off x="76200" y="1295400"/>
+            <a:ext cx="8991600" cy="5257800"/>
           </a:xfrm>
           <a:prstGeom prst="rect">
             <a:avLst/>
@@ -6031,16 +7850,29 @@
             <p:ph type="title"/>
           </p:nvPr>
         </p:nvSpPr>
-        <p:spPr/>
-        <p:txBody>
-          <a:bodyPr/>
-          <a:lstStyle/>
-          <a:p>
-            <a:r>
-              <a:rPr lang="en-US" b="1" dirty="0" smtClean="0"/>
-              <a:t>Who can apply?</a:t>
-            </a:r>
-            <a:endParaRPr lang="en-US" b="1" dirty="0"/>
+        <p:spPr>
+          <a:xfrm>
+            <a:off x="457200" y="76200"/>
+            <a:ext cx="8229600" cy="1143000"/>
+          </a:xfrm>
+        </p:spPr>
+        <p:txBody>
+          <a:bodyPr>
+            <a:normAutofit fontScale="90000"/>
+          </a:bodyPr>
+          <a:lstStyle/>
+          <a:p>
+            <a:r>
+              <a:rPr lang="en-US" b="1" dirty="0" smtClean="0">
+                <a:latin typeface="Times New Roman"/>
+                <a:cs typeface="Times New Roman"/>
+              </a:rPr>
+              <a:t>What does a PIRE fellowship cover?</a:t>
+            </a:r>
+            <a:endParaRPr lang="en-US" b="1" dirty="0">
+              <a:latin typeface="Times New Roman"/>
+              <a:cs typeface="Times New Roman"/>
+            </a:endParaRPr>
           </a:p>
         </p:txBody>
       </p:sp>
@@ -6057,7 +7889,7 @@
         <p:spPr/>
         <p:txBody>
           <a:bodyPr>
-            <a:normAutofit lnSpcReduction="10000"/>
+            <a:normAutofit/>
           </a:bodyPr>
           <a:lstStyle/>
           <a:p>
@@ -6065,63 +7897,99 @@
               <a:buNone/>
             </a:pPr>
             <a:r>
-              <a:rPr lang="en-US" b="1" dirty="0" smtClean="0"/>
+              <a:rPr lang="en-US" b="1" dirty="0" smtClean="0">
+                <a:latin typeface="Times New Roman"/>
+                <a:cs typeface="Times New Roman"/>
+              </a:rPr>
               <a:t> </a:t>
             </a:r>
-            <a:endParaRPr lang="en-US" b="1" dirty="0"/>
-          </a:p>
-          <a:p>
-            <a:pPr lvl="0"/>
-            <a:r>
-              <a:rPr lang="en-US" dirty="0" smtClean="0"/>
-              <a:t>Students can apply during the time they are completing the research experience</a:t>
-            </a:r>
-          </a:p>
-          <a:p>
-            <a:pPr lvl="0">
-              <a:buNone/>
-            </a:pPr>
-            <a:endParaRPr lang="en-US" dirty="0" smtClean="0"/>
-          </a:p>
-          <a:p>
-            <a:pPr lvl="0"/>
-            <a:r>
-              <a:rPr lang="en-US" dirty="0" smtClean="0"/>
-              <a:t>In other words, students who plan to enroll in </a:t>
-            </a:r>
-            <a:r>
-              <a:rPr lang="en-US" dirty="0"/>
-              <a:t>research credits with CLS faculty </a:t>
-            </a:r>
-            <a:r>
-              <a:rPr lang="en-US" dirty="0" smtClean="0"/>
-              <a:t>in Fall </a:t>
-            </a:r>
-            <a:r>
-              <a:rPr lang="en-US" dirty="0" smtClean="0"/>
-              <a:t>2014 </a:t>
-            </a:r>
-            <a:r>
-              <a:rPr lang="en-US" dirty="0" smtClean="0"/>
-              <a:t>and Spring </a:t>
-            </a:r>
-            <a:r>
-              <a:rPr lang="en-US" dirty="0" smtClean="0"/>
-              <a:t>2015 </a:t>
-            </a:r>
-            <a:r>
-              <a:rPr lang="en-US" dirty="0" smtClean="0"/>
-              <a:t>are </a:t>
-            </a:r>
-            <a:r>
-              <a:rPr lang="en-US" dirty="0"/>
-              <a:t>eligible to </a:t>
-            </a:r>
-            <a:r>
-              <a:rPr lang="en-US" dirty="0" smtClean="0"/>
-              <a:t>apply</a:t>
-            </a:r>
-            <a:endParaRPr lang="en-US" dirty="0"/>
+            <a:endParaRPr lang="en-US" b="1" dirty="0">
+              <a:latin typeface="Times New Roman"/>
+              <a:cs typeface="Times New Roman"/>
+            </a:endParaRPr>
+          </a:p>
+          <a:p>
+            <a:r>
+              <a:rPr lang="en-US" dirty="0" smtClean="0">
+                <a:latin typeface="Times New Roman"/>
+                <a:cs typeface="Times New Roman"/>
+              </a:rPr>
+              <a:t>All expense-paid trip (</a:t>
+            </a:r>
+            <a:r>
+              <a:rPr lang="en-US" sz="2400" dirty="0" smtClean="0">
+                <a:latin typeface="Times New Roman"/>
+                <a:cs typeface="Times New Roman"/>
+              </a:rPr>
+              <a:t>expenses cannot exceed the PIRE budgeted amounts</a:t>
+            </a:r>
+            <a:r>
+              <a:rPr lang="en-US" dirty="0" smtClean="0">
+                <a:latin typeface="Times New Roman"/>
+                <a:cs typeface="Times New Roman"/>
+              </a:rPr>
+              <a:t>):</a:t>
+            </a:r>
+          </a:p>
+          <a:p>
+            <a:pPr lvl="1"/>
+            <a:r>
+              <a:rPr lang="en-US" dirty="0" smtClean="0">
+                <a:latin typeface="Times New Roman"/>
+                <a:cs typeface="Times New Roman"/>
+              </a:rPr>
+              <a:t>Airfare</a:t>
+            </a:r>
+          </a:p>
+          <a:p>
+            <a:pPr lvl="1"/>
+            <a:r>
+              <a:rPr lang="en-US" dirty="0" smtClean="0">
+                <a:latin typeface="Times New Roman"/>
+                <a:cs typeface="Times New Roman"/>
+              </a:rPr>
+              <a:t>Lodging</a:t>
+            </a:r>
+          </a:p>
+          <a:p>
+            <a:pPr lvl="1"/>
+            <a:r>
+              <a:rPr lang="en-US" dirty="0" smtClean="0">
+                <a:latin typeface="Times New Roman"/>
+                <a:cs typeface="Times New Roman"/>
+              </a:rPr>
+              <a:t>Meals and incidentals</a:t>
+            </a:r>
+          </a:p>
+          <a:p>
+            <a:pPr lvl="1"/>
+            <a:r>
+              <a:rPr lang="en-US" dirty="0" smtClean="0">
+                <a:latin typeface="Times New Roman"/>
+                <a:cs typeface="Times New Roman"/>
+              </a:rPr>
+              <a:t>Research expenses </a:t>
+            </a:r>
+          </a:p>
+          <a:p>
+            <a:pPr lvl="1"/>
+            <a:r>
+              <a:rPr lang="en-US" dirty="0" smtClean="0">
+                <a:latin typeface="Times New Roman"/>
+                <a:cs typeface="Times New Roman"/>
+              </a:rPr>
+              <a:t>Summer tuition (more on this later)</a:t>
+            </a:r>
+            <a:endParaRPr lang="en-US" dirty="0">
+              <a:latin typeface="Times New Roman"/>
+              <a:cs typeface="Times New Roman"/>
+            </a:endParaRPr>
+          </a:p>
+          <a:p>
+            <a:endParaRPr lang="en-US" dirty="0">
+              <a:latin typeface="Times New Roman"/>
+              <a:cs typeface="Times New Roman"/>
+            </a:endParaRPr>
           </a:p>
         </p:txBody>
       </p:sp>
@@ -6134,7 +8002,7 @@
         <p:spPr>
           <a:xfrm>
             <a:off x="381000" y="1295400"/>
-            <a:ext cx="8458200" cy="4876800"/>
+            <a:ext cx="8077200" cy="4876800"/>
           </a:xfrm>
           <a:prstGeom prst="rect">
             <a:avLst/>
@@ -6223,10 +8091,16 @@
           <a:lstStyle/>
           <a:p>
             <a:r>
-              <a:rPr lang="en-US" b="1" dirty="0" smtClean="0"/>
+              <a:rPr lang="en-US" b="1" dirty="0" smtClean="0">
+                <a:latin typeface="Times New Roman"/>
+                <a:cs typeface="Times New Roman"/>
+              </a:rPr>
               <a:t>Who can apply?</a:t>
             </a:r>
-            <a:endParaRPr lang="en-US" b="1" dirty="0"/>
+            <a:endParaRPr lang="en-US" b="1" dirty="0">
+              <a:latin typeface="Times New Roman"/>
+              <a:cs typeface="Times New Roman"/>
+            </a:endParaRPr>
           </a:p>
         </p:txBody>
       </p:sp>
@@ -6243,7 +8117,7 @@
         <p:spPr/>
         <p:txBody>
           <a:bodyPr>
-            <a:normAutofit/>
+            <a:normAutofit fontScale="85000" lnSpcReduction="20000"/>
           </a:bodyPr>
           <a:lstStyle/>
           <a:p>
@@ -6251,66 +8125,86 @@
               <a:buNone/>
             </a:pPr>
             <a:r>
-              <a:rPr lang="en-US" b="1" dirty="0" smtClean="0"/>
+              <a:rPr lang="en-US" b="1" dirty="0" smtClean="0">
+                <a:latin typeface="Times New Roman"/>
+                <a:cs typeface="Times New Roman"/>
+              </a:rPr>
               <a:t> </a:t>
             </a:r>
-            <a:endParaRPr lang="en-US" b="1" dirty="0"/>
-          </a:p>
-          <a:p>
-            <a:pPr>
+            <a:endParaRPr lang="en-US" b="1" dirty="0">
+              <a:latin typeface="Times New Roman"/>
+              <a:cs typeface="Times New Roman"/>
+            </a:endParaRPr>
+          </a:p>
+          <a:p>
+            <a:pPr lvl="0"/>
+            <a:r>
+              <a:rPr lang="en-US" dirty="0" smtClean="0">
+                <a:latin typeface="Times New Roman"/>
+                <a:cs typeface="Times New Roman"/>
+              </a:rPr>
+              <a:t>U.S. and non-U.S.citizens (the latter must be in the College of the Liberal Arts)</a:t>
+            </a:r>
+          </a:p>
+          <a:p>
+            <a:pPr lvl="0"/>
+            <a:endParaRPr lang="en-US" dirty="0">
+              <a:latin typeface="Times New Roman"/>
+              <a:cs typeface="Times New Roman"/>
+            </a:endParaRPr>
+          </a:p>
+          <a:p>
+            <a:pPr lvl="0"/>
+            <a:r>
+              <a:rPr lang="en-US" dirty="0">
+                <a:latin typeface="Times New Roman"/>
+                <a:cs typeface="Times New Roman"/>
+              </a:rPr>
+              <a:t>Must conduct research for the proposed summer research experience that fits with the goals of the CLS PIRE </a:t>
+            </a:r>
+            <a:r>
+              <a:rPr lang="en-US" dirty="0" smtClean="0">
+                <a:latin typeface="Times New Roman"/>
+                <a:cs typeface="Times New Roman"/>
+              </a:rPr>
+              <a:t>project</a:t>
+            </a:r>
+          </a:p>
+          <a:p>
+            <a:pPr lvl="0">
               <a:buNone/>
             </a:pPr>
-            <a:r>
-              <a:rPr lang="en-US" dirty="0" smtClean="0"/>
-              <a:t>	Students </a:t>
-            </a:r>
-            <a:r>
-              <a:rPr lang="en-US" dirty="0"/>
-              <a:t>who currently </a:t>
-            </a:r>
-            <a:r>
-              <a:rPr lang="en-US" dirty="0" smtClean="0"/>
-              <a:t>do </a:t>
-            </a:r>
-            <a:r>
-              <a:rPr lang="en-US" dirty="0"/>
-              <a:t>not have research experience can prepare themselves for eligibility by enrolling in research credits with a CLS </a:t>
-            </a:r>
-            <a:r>
-              <a:rPr lang="en-US" dirty="0" smtClean="0"/>
-              <a:t>faculty </a:t>
-            </a:r>
-            <a:r>
-              <a:rPr lang="en-US" dirty="0"/>
-              <a:t>member starting in Fall </a:t>
-            </a:r>
-            <a:r>
-              <a:rPr lang="en-US" dirty="0" smtClean="0"/>
-              <a:t>2014 </a:t>
-            </a:r>
-            <a:endParaRPr lang="en-US" dirty="0" smtClean="0"/>
-          </a:p>
-          <a:p>
-            <a:pPr>
-              <a:buNone/>
-            </a:pPr>
-            <a:r>
-              <a:rPr lang="en-US" dirty="0"/>
-              <a:t>	</a:t>
-            </a:r>
-            <a:r>
-              <a:rPr lang="en-US" dirty="0" smtClean="0"/>
-              <a:t>and </a:t>
-            </a:r>
-            <a:r>
-              <a:rPr lang="en-US" dirty="0"/>
-              <a:t>continuing in Spring </a:t>
-            </a:r>
-            <a:r>
-              <a:rPr lang="en-US" dirty="0" smtClean="0"/>
-              <a:t>2015</a:t>
-            </a:r>
-            <a:endParaRPr lang="en-US" dirty="0"/>
+            <a:endParaRPr lang="en-US" dirty="0">
+              <a:latin typeface="Times New Roman"/>
+              <a:cs typeface="Times New Roman"/>
+            </a:endParaRPr>
+          </a:p>
+          <a:p>
+            <a:r>
+              <a:rPr lang="en-US" dirty="0">
+                <a:latin typeface="Times New Roman"/>
+                <a:cs typeface="Times New Roman"/>
+              </a:rPr>
+              <a:t>Must have completed research experience with a CLS research faculty member </a:t>
+            </a:r>
+            <a:r>
+              <a:rPr lang="en-US" b="1" dirty="0">
+                <a:latin typeface="Times New Roman"/>
+                <a:cs typeface="Times New Roman"/>
+              </a:rPr>
+              <a:t>for at least one year prior to summer </a:t>
+            </a:r>
+            <a:r>
+              <a:rPr lang="en-US" b="1" dirty="0" smtClean="0">
+                <a:latin typeface="Times New Roman"/>
+                <a:cs typeface="Times New Roman"/>
+              </a:rPr>
+              <a:t>travel</a:t>
+            </a:r>
+            <a:endParaRPr lang="en-US" dirty="0">
+              <a:latin typeface="Times New Roman"/>
+              <a:cs typeface="Times New Roman"/>
+            </a:endParaRPr>
           </a:p>
         </p:txBody>
       </p:sp>
@@ -6323,7 +8217,7 @@
         <p:spPr>
           <a:xfrm>
             <a:off x="381000" y="1295400"/>
-            <a:ext cx="8077200" cy="4876800"/>
+            <a:ext cx="8458200" cy="4876800"/>
           </a:xfrm>
           <a:prstGeom prst="rect">
             <a:avLst/>
@@ -6412,10 +8306,16 @@
           <a:lstStyle/>
           <a:p>
             <a:r>
-              <a:rPr lang="en-US" b="1" dirty="0" smtClean="0"/>
+              <a:rPr lang="en-US" b="1" dirty="0" smtClean="0">
+                <a:latin typeface="Times New Roman"/>
+                <a:cs typeface="Times New Roman"/>
+              </a:rPr>
               <a:t>Who can apply?</a:t>
             </a:r>
-            <a:endParaRPr lang="en-US" b="1" dirty="0"/>
+            <a:endParaRPr lang="en-US" b="1" dirty="0">
+              <a:latin typeface="Times New Roman"/>
+              <a:cs typeface="Times New Roman"/>
+            </a:endParaRPr>
           </a:p>
         </p:txBody>
       </p:sp>
@@ -6440,32 +8340,77 @@
               <a:buNone/>
             </a:pPr>
             <a:r>
-              <a:rPr lang="en-US" b="1" dirty="0" smtClean="0"/>
+              <a:rPr lang="en-US" b="1" dirty="0" smtClean="0">
+                <a:latin typeface="Times New Roman"/>
+                <a:cs typeface="Times New Roman"/>
+              </a:rPr>
               <a:t> </a:t>
             </a:r>
-            <a:endParaRPr lang="en-US" b="1" dirty="0"/>
+            <a:endParaRPr lang="en-US" b="1" dirty="0">
+              <a:latin typeface="Times New Roman"/>
+              <a:cs typeface="Times New Roman"/>
+            </a:endParaRPr>
+          </a:p>
+          <a:p>
+            <a:pPr lvl="0"/>
+            <a:r>
+              <a:rPr lang="en-US" dirty="0" smtClean="0">
+                <a:latin typeface="Times New Roman"/>
+                <a:cs typeface="Times New Roman"/>
+              </a:rPr>
+              <a:t>Students can apply during the time they are completing the research experience</a:t>
+            </a:r>
           </a:p>
           <a:p>
             <a:pPr lvl="0">
               <a:buNone/>
             </a:pPr>
-            <a:r>
-              <a:rPr lang="en-US" dirty="0"/>
-              <a:t>	</a:t>
-            </a:r>
-            <a:r>
-              <a:rPr lang="en-US" dirty="0" smtClean="0"/>
-              <a:t>Eligible </a:t>
-            </a:r>
-            <a:r>
-              <a:rPr lang="en-US" dirty="0"/>
-              <a:t>students will have at least once semester in residence remaining at PSU after returning from the summer abroad research </a:t>
-            </a:r>
-            <a:r>
-              <a:rPr lang="en-US" dirty="0" smtClean="0"/>
-              <a:t>experience (i.e., students in their senior year are not eligible to apply)</a:t>
-            </a:r>
-            <a:endParaRPr lang="en-US" dirty="0"/>
+            <a:endParaRPr lang="en-US" dirty="0" smtClean="0">
+              <a:latin typeface="Times New Roman"/>
+              <a:cs typeface="Times New Roman"/>
+            </a:endParaRPr>
+          </a:p>
+          <a:p>
+            <a:pPr lvl="0"/>
+            <a:r>
+              <a:rPr lang="en-US" dirty="0" smtClean="0">
+                <a:latin typeface="Times New Roman"/>
+                <a:cs typeface="Times New Roman"/>
+              </a:rPr>
+              <a:t>In other words, students who plan to enroll in </a:t>
+            </a:r>
+            <a:r>
+              <a:rPr lang="en-US" dirty="0">
+                <a:latin typeface="Times New Roman"/>
+                <a:cs typeface="Times New Roman"/>
+              </a:rPr>
+              <a:t>research credits with CLS faculty </a:t>
+            </a:r>
+            <a:r>
+              <a:rPr lang="en-US" dirty="0" smtClean="0">
+                <a:latin typeface="Times New Roman"/>
+                <a:cs typeface="Times New Roman"/>
+              </a:rPr>
+              <a:t>in Fall 2014 and Spring 2015 are </a:t>
+            </a:r>
+            <a:r>
+              <a:rPr lang="en-US" dirty="0">
+                <a:latin typeface="Times New Roman"/>
+                <a:cs typeface="Times New Roman"/>
+              </a:rPr>
+              <a:t>eligible to </a:t>
+            </a:r>
+            <a:r>
+              <a:rPr lang="en-US" dirty="0" smtClean="0">
+                <a:latin typeface="Times New Roman"/>
+                <a:cs typeface="Times New Roman"/>
+              </a:rPr>
+              <a:t>apply</a:t>
+            </a:r>
+            <a:endParaRPr lang="en-US" dirty="0">
+              <a:latin typeface="Times New Roman"/>
+              <a:cs typeface="Times New Roman"/>
+            </a:endParaRPr>
           </a:p>
         </p:txBody>
       </p:sp>
@@ -6478,7 +8423,7 @@
         <p:spPr>
           <a:xfrm>
             <a:off x="381000" y="1295400"/>
-            <a:ext cx="8077200" cy="4876800"/>
+            <a:ext cx="8458200" cy="4876800"/>
           </a:xfrm>
           <a:prstGeom prst="rect">
             <a:avLst/>
@@ -6561,119 +8506,147 @@
             <p:ph type="title"/>
           </p:nvPr>
         </p:nvSpPr>
-        <p:spPr>
-          <a:xfrm>
-            <a:off x="457200" y="0"/>
-            <a:ext cx="8229600" cy="1143000"/>
-          </a:xfrm>
-        </p:spPr>
+        <p:spPr/>
+        <p:txBody>
+          <a:bodyPr/>
+          <a:lstStyle/>
+          <a:p>
+            <a:r>
+              <a:rPr lang="en-US" b="1" dirty="0" smtClean="0">
+                <a:latin typeface="Times New Roman"/>
+                <a:cs typeface="Times New Roman"/>
+              </a:rPr>
+              <a:t>Who can apply?</a:t>
+            </a:r>
+            <a:endParaRPr lang="en-US" b="1" dirty="0">
+              <a:latin typeface="Times New Roman"/>
+              <a:cs typeface="Times New Roman"/>
+            </a:endParaRPr>
+          </a:p>
+        </p:txBody>
+      </p:sp>
+      <p:sp>
+        <p:nvSpPr>
+          <p:cNvPr id="3" name="Content Placeholder 2"/>
+          <p:cNvSpPr>
+            <a:spLocks noGrp="1"/>
+          </p:cNvSpPr>
+          <p:nvPr>
+            <p:ph idx="1"/>
+          </p:nvPr>
+        </p:nvSpPr>
+        <p:spPr/>
         <p:txBody>
           <a:bodyPr>
-            <a:normAutofit fontScale="90000"/>
+            <a:normAutofit/>
           </a:bodyPr>
           <a:lstStyle/>
           <a:p>
-            <a:r>
-              <a:rPr lang="en-US" dirty="0" smtClean="0"/>
-              <a:t>What are PIRE fellows expected to do?</a:t>
-            </a:r>
-            <a:endParaRPr lang="en-US" dirty="0"/>
-          </a:p>
-        </p:txBody>
-      </p:sp>
-      <p:sp>
-        <p:nvSpPr>
-          <p:cNvPr id="3" name="Content Placeholder 2"/>
-          <p:cNvSpPr>
-            <a:spLocks noGrp="1"/>
-          </p:cNvSpPr>
-          <p:nvPr>
-            <p:ph idx="1"/>
-          </p:nvPr>
-        </p:nvSpPr>
-        <p:spPr/>
-        <p:txBody>
-          <a:bodyPr>
-            <a:normAutofit fontScale="85000" lnSpcReduction="20000"/>
-          </a:bodyPr>
-          <a:lstStyle/>
-          <a:p>
-            <a:pPr lvl="0"/>
-            <a:r>
-              <a:rPr lang="en-US" dirty="0"/>
-              <a:t>Enroll in 6 credits of LING 496 during the summer of travel </a:t>
-            </a:r>
-            <a:r>
-              <a:rPr lang="en-US" dirty="0" smtClean="0"/>
-              <a:t>abroad </a:t>
-            </a:r>
-          </a:p>
-          <a:p>
-            <a:pPr lvl="0">
+            <a:pPr>
               <a:buNone/>
             </a:pPr>
-            <a:endParaRPr lang="en-US" dirty="0"/>
-          </a:p>
-          <a:p>
-            <a:pPr lvl="0"/>
-            <a:r>
-              <a:rPr lang="en-US" dirty="0"/>
-              <a:t>Enroll in 3 research credits with their CLS advisor during the returning in- residence semester (i.e. Fall </a:t>
-            </a:r>
-            <a:r>
-              <a:rPr lang="en-US" dirty="0" smtClean="0"/>
-              <a:t>2015 </a:t>
-            </a:r>
-            <a:r>
-              <a:rPr lang="en-US" dirty="0"/>
-              <a:t>for students traveling during Summer </a:t>
-            </a:r>
-            <a:r>
-              <a:rPr lang="en-US" dirty="0" smtClean="0"/>
-              <a:t>2015) </a:t>
-            </a:r>
-            <a:r>
-              <a:rPr lang="en-US" dirty="0"/>
-              <a:t>to complete their </a:t>
-            </a:r>
-            <a:r>
-              <a:rPr lang="en-US" dirty="0" smtClean="0"/>
-              <a:t>project and </a:t>
-            </a:r>
-            <a:r>
-              <a:rPr lang="en-US" dirty="0"/>
-              <a:t>present their work at the </a:t>
-            </a:r>
-            <a:r>
-              <a:rPr lang="en-US" dirty="0" smtClean="0"/>
-              <a:t>CLS.</a:t>
-            </a:r>
-          </a:p>
-          <a:p>
-            <a:pPr marL="0" lvl="0" indent="0">
+            <a:r>
+              <a:rPr lang="en-US" b="1" dirty="0" smtClean="0">
+                <a:latin typeface="Times New Roman"/>
+                <a:cs typeface="Times New Roman"/>
+              </a:rPr>
+              <a:t> </a:t>
+            </a:r>
+            <a:endParaRPr lang="en-US" b="1" dirty="0">
+              <a:latin typeface="Times New Roman"/>
+              <a:cs typeface="Times New Roman"/>
+            </a:endParaRPr>
+          </a:p>
+          <a:p>
+            <a:pPr>
               <a:buNone/>
             </a:pPr>
-            <a:endParaRPr lang="en-US" dirty="0"/>
-          </a:p>
-          <a:p>
-            <a:pPr lvl="0"/>
-            <a:r>
-              <a:rPr lang="en-US" dirty="0"/>
-              <a:t>Attend the CLS meetings, which are held every Friday </a:t>
-            </a:r>
-            <a:r>
-              <a:rPr lang="en-US" dirty="0" smtClean="0"/>
-              <a:t>morning</a:t>
-            </a:r>
-            <a:r>
-              <a:rPr lang="en-US" dirty="0"/>
-              <a:t> </a:t>
-            </a:r>
-            <a:r>
-              <a:rPr lang="en-US" dirty="0" smtClean="0"/>
-              <a:t>from 9:00 to 10:30 in Moore 127.</a:t>
-            </a:r>
-            <a:endParaRPr lang="en-US" dirty="0"/>
+            <a:r>
+              <a:rPr lang="en-US" dirty="0" smtClean="0">
+                <a:latin typeface="Times New Roman"/>
+                <a:cs typeface="Times New Roman"/>
+              </a:rPr>
+              <a:t>	Students </a:t>
+            </a:r>
+            <a:r>
+              <a:rPr lang="en-US" dirty="0">
+                <a:latin typeface="Times New Roman"/>
+                <a:cs typeface="Times New Roman"/>
+              </a:rPr>
+              <a:t>who currently </a:t>
+            </a:r>
+            <a:r>
+              <a:rPr lang="en-US" dirty="0" smtClean="0">
+                <a:latin typeface="Times New Roman"/>
+                <a:cs typeface="Times New Roman"/>
+              </a:rPr>
+              <a:t>do </a:t>
+            </a:r>
+            <a:r>
+              <a:rPr lang="en-US" dirty="0">
+                <a:latin typeface="Times New Roman"/>
+                <a:cs typeface="Times New Roman"/>
+              </a:rPr>
+              <a:t>not have research experience can prepare themselves for eligibility by enrolling in research credits with a CLS </a:t>
+            </a:r>
+            <a:r>
+              <a:rPr lang="en-US" dirty="0" smtClean="0">
+                <a:latin typeface="Times New Roman"/>
+                <a:cs typeface="Times New Roman"/>
+              </a:rPr>
+              <a:t>faculty </a:t>
+            </a:r>
+            <a:r>
+              <a:rPr lang="en-US" dirty="0">
+                <a:latin typeface="Times New Roman"/>
+                <a:cs typeface="Times New Roman"/>
+              </a:rPr>
+              <a:t>member starting in Fall </a:t>
+            </a:r>
+            <a:r>
+              <a:rPr lang="en-US" dirty="0" smtClean="0">
+                <a:latin typeface="Times New Roman"/>
+                <a:cs typeface="Times New Roman"/>
+              </a:rPr>
+              <a:t>2014 </a:t>
+            </a:r>
+          </a:p>
+          <a:p>
+            <a:pPr>
+              <a:buNone/>
+            </a:pPr>
+            <a:r>
+              <a:rPr lang="en-US" dirty="0">
+                <a:latin typeface="Times New Roman"/>
+                <a:cs typeface="Times New Roman"/>
+              </a:rPr>
+              <a:t>	</a:t>
+            </a:r>
+            <a:r>
+              <a:rPr lang="en-US" dirty="0" smtClean="0">
+                <a:latin typeface="Times New Roman"/>
+                <a:cs typeface="Times New Roman"/>
+              </a:rPr>
+              <a:t>and </a:t>
+            </a:r>
+            <a:r>
+              <a:rPr lang="en-US" dirty="0">
+                <a:latin typeface="Times New Roman"/>
+                <a:cs typeface="Times New Roman"/>
+              </a:rPr>
+              <a:t>continuing in Spring </a:t>
+            </a:r>
+            <a:r>
+              <a:rPr lang="en-US" dirty="0" smtClean="0">
+                <a:latin typeface="Times New Roman"/>
+                <a:cs typeface="Times New Roman"/>
+              </a:rPr>
+              <a:t>2015</a:t>
+            </a:r>
+            <a:endParaRPr lang="en-US" dirty="0">
+              <a:latin typeface="Times New Roman"/>
+              <a:cs typeface="Times New Roman"/>
+            </a:endParaRPr>
           </a:p>
         </p:txBody>
       </p:sp>
@@ -6686,7 +8659,7 @@
         <p:spPr>
           <a:xfrm>
             <a:off x="381000" y="1295400"/>
-            <a:ext cx="8534400" cy="4876800"/>
+            <a:ext cx="8077200" cy="4876800"/>
           </a:xfrm>
           <a:prstGeom prst="rect">
             <a:avLst/>
@@ -6732,6 +8705,13 @@
   <p:clrMapOvr>
     <a:masterClrMapping/>
   </p:clrMapOvr>
+  <p:timing>
+    <p:tnLst>
+      <p:par>
+        <p:cTn xmlns:p14="http://schemas.microsoft.com/office/powerpoint/2010/main" id="1" dur="indefinite" restart="never" nodeType="tmRoot"/>
+      </p:par>
+    </p:tnLst>
+  </p:timing>
 </p:sld>
 </file>
 

</xml_diff>